<commit_message>
added images and references
</commit_message>
<xml_diff>
--- a/Fall 17/Agent Oriented Programming.pptx
+++ b/Fall 17/Agent Oriented Programming.pptx
@@ -15,11 +15,12 @@
     <p:sldId id="266" r:id="rId9"/>
     <p:sldId id="263" r:id="rId10"/>
     <p:sldId id="262" r:id="rId11"/>
-    <p:sldId id="268" r:id="rId12"/>
-    <p:sldId id="270" r:id="rId13"/>
-    <p:sldId id="271" r:id="rId14"/>
-    <p:sldId id="259" r:id="rId15"/>
-    <p:sldId id="269" r:id="rId16"/>
+    <p:sldId id="272" r:id="rId12"/>
+    <p:sldId id="268" r:id="rId13"/>
+    <p:sldId id="270" r:id="rId14"/>
+    <p:sldId id="271" r:id="rId15"/>
+    <p:sldId id="259" r:id="rId16"/>
+    <p:sldId id="269" r:id="rId17"/>
   </p:sldIdLst>
   <p:sldSz cx="9144000" cy="6858000" type="screen4x3"/>
   <p:notesSz cx="6858000" cy="9144000"/>
@@ -232,7 +233,7 @@
           <a:p>
             <a:fld id="{7DF82878-26A6-4D39-A45C-D551A71D01FF}" type="datetimeFigureOut">
               <a:rPr lang="en-US" smtClean="0"/>
-              <a:t>8/22/2017</a:t>
+              <a:t>9/2/2017</a:t>
             </a:fld>
             <a:endParaRPr lang="en-US"/>
           </a:p>
@@ -458,7 +459,7 @@
           <a:p>
             <a:fld id="{7DF82878-26A6-4D39-A45C-D551A71D01FF}" type="datetimeFigureOut">
               <a:rPr lang="en-US" smtClean="0"/>
-              <a:t>8/22/2017</a:t>
+              <a:t>9/2/2017</a:t>
             </a:fld>
             <a:endParaRPr lang="en-US"/>
           </a:p>
@@ -633,7 +634,7 @@
           <a:p>
             <a:fld id="{7DF82878-26A6-4D39-A45C-D551A71D01FF}" type="datetimeFigureOut">
               <a:rPr lang="en-US" smtClean="0"/>
-              <a:t>8/22/2017</a:t>
+              <a:t>9/2/2017</a:t>
             </a:fld>
             <a:endParaRPr lang="en-US"/>
           </a:p>
@@ -798,7 +799,7 @@
           <a:p>
             <a:fld id="{7DF82878-26A6-4D39-A45C-D551A71D01FF}" type="datetimeFigureOut">
               <a:rPr lang="en-US" smtClean="0"/>
-              <a:t>8/22/2017</a:t>
+              <a:t>9/2/2017</a:t>
             </a:fld>
             <a:endParaRPr lang="en-US"/>
           </a:p>
@@ -1042,7 +1043,7 @@
           <a:p>
             <a:fld id="{7DF82878-26A6-4D39-A45C-D551A71D01FF}" type="datetimeFigureOut">
               <a:rPr lang="en-US" smtClean="0"/>
-              <a:t>8/22/2017</a:t>
+              <a:t>9/2/2017</a:t>
             </a:fld>
             <a:endParaRPr lang="en-US"/>
           </a:p>
@@ -1306,7 +1307,7 @@
           <a:p>
             <a:fld id="{7DF82878-26A6-4D39-A45C-D551A71D01FF}" type="datetimeFigureOut">
               <a:rPr lang="en-US" smtClean="0"/>
-              <a:t>8/22/2017</a:t>
+              <a:t>9/2/2017</a:t>
             </a:fld>
             <a:endParaRPr lang="en-US"/>
           </a:p>
@@ -1680,7 +1681,7 @@
           <a:p>
             <a:fld id="{7DF82878-26A6-4D39-A45C-D551A71D01FF}" type="datetimeFigureOut">
               <a:rPr lang="en-US" smtClean="0"/>
-              <a:t>8/22/2017</a:t>
+              <a:t>9/2/2017</a:t>
             </a:fld>
             <a:endParaRPr lang="en-US"/>
           </a:p>
@@ -1793,7 +1794,7 @@
           <a:p>
             <a:fld id="{7DF82878-26A6-4D39-A45C-D551A71D01FF}" type="datetimeFigureOut">
               <a:rPr lang="en-US" smtClean="0"/>
-              <a:t>8/22/2017</a:t>
+              <a:t>9/2/2017</a:t>
             </a:fld>
             <a:endParaRPr lang="en-US"/>
           </a:p>
@@ -1883,7 +1884,7 @@
           <a:p>
             <a:fld id="{7DF82878-26A6-4D39-A45C-D551A71D01FF}" type="datetimeFigureOut">
               <a:rPr lang="en-US" smtClean="0"/>
-              <a:t>8/22/2017</a:t>
+              <a:t>9/2/2017</a:t>
             </a:fld>
             <a:endParaRPr lang="en-US"/>
           </a:p>
@@ -2141,7 +2142,7 @@
           <a:p>
             <a:fld id="{7DF82878-26A6-4D39-A45C-D551A71D01FF}" type="datetimeFigureOut">
               <a:rPr lang="en-US" smtClean="0"/>
-              <a:t>8/22/2017</a:t>
+              <a:t>9/2/2017</a:t>
             </a:fld>
             <a:endParaRPr lang="en-US"/>
           </a:p>
@@ -2405,7 +2406,7 @@
           <a:p>
             <a:fld id="{7DF82878-26A6-4D39-A45C-D551A71D01FF}" type="datetimeFigureOut">
               <a:rPr lang="en-US" smtClean="0"/>
-              <a:t>8/22/2017</a:t>
+              <a:t>9/2/2017</a:t>
             </a:fld>
             <a:endParaRPr lang="en-US"/>
           </a:p>
@@ -2622,7 +2623,7 @@
           <a:p>
             <a:fld id="{7DF82878-26A6-4D39-A45C-D551A71D01FF}" type="datetimeFigureOut">
               <a:rPr lang="en-US" smtClean="0"/>
-              <a:t>8/22/2017</a:t>
+              <a:t>9/2/2017</a:t>
             </a:fld>
             <a:endParaRPr lang="en-US"/>
           </a:p>
@@ -3105,20 +3106,11 @@
               <a:rPr lang="en-US" dirty="0" smtClean="0"/>
               <a:t> presentation on the AOP model and its benefits for software development </a:t>
             </a:r>
-            <a:endParaRPr lang="en-US" dirty="0" smtClean="0"/>
           </a:p>
           <a:p>
             <a:r>
               <a:rPr lang="en-US" dirty="0" smtClean="0"/>
-              <a:t>by </a:t>
-            </a:r>
-            <a:r>
-              <a:rPr lang="en-US" dirty="0" smtClean="0"/>
-              <a:t>Landon </a:t>
-            </a:r>
-            <a:r>
-              <a:rPr lang="en-US" dirty="0" smtClean="0"/>
-              <a:t>Shumway</a:t>
+              <a:t>by Landon Shumway</a:t>
             </a:r>
           </a:p>
           <a:p>
@@ -3126,7 +3118,6 @@
               <a:rPr lang="en-US" dirty="0" smtClean="0"/>
               <a:t>BYU-Idaho Society for Artificial Intelligence</a:t>
             </a:r>
-            <a:endParaRPr lang="en-US" dirty="0" smtClean="0"/>
           </a:p>
           <a:p>
             <a:endParaRPr lang="en-US" dirty="0"/>
@@ -3925,6 +3916,901 @@
         </p:nvSpPr>
         <p:spPr/>
         <p:txBody>
+          <a:bodyPr/>
+          <a:lstStyle/>
+          <a:p>
+            <a:r>
+              <a:rPr lang="en-US" dirty="0" smtClean="0"/>
+              <a:t>Decoupling and Scalability</a:t>
+            </a:r>
+            <a:endParaRPr lang="en-US" dirty="0"/>
+          </a:p>
+        </p:txBody>
+      </p:sp>
+      <p:pic>
+        <p:nvPicPr>
+          <p:cNvPr id="2050" name="Picture 2" descr="C:\Users\Landon\Downloads\lego-190704_1920.jpg"/>
+          <p:cNvPicPr>
+            <a:picLocks noChangeAspect="1" noChangeArrowheads="1"/>
+          </p:cNvPicPr>
+          <p:nvPr/>
+        </p:nvPicPr>
+        <p:blipFill>
+          <a:blip r:embed="rId2">
+            <a:extLst>
+              <a:ext uri="{28A0092B-C50C-407E-A947-70E740481C1C}">
+                <a14:useLocalDpi xmlns:a14="http://schemas.microsoft.com/office/drawing/2010/main" val="0"/>
+              </a:ext>
+            </a:extLst>
+          </a:blip>
+          <a:srcRect/>
+          <a:stretch>
+            <a:fillRect/>
+          </a:stretch>
+        </p:blipFill>
+        <p:spPr bwMode="auto">
+          <a:xfrm>
+            <a:off x="0" y="4114800"/>
+            <a:ext cx="9144000" cy="2743200"/>
+          </a:xfrm>
+          <a:prstGeom prst="rect">
+            <a:avLst/>
+          </a:prstGeom>
+          <a:noFill/>
+          <a:extLst>
+            <a:ext uri="{909E8E84-426E-40DD-AFC4-6F175D3DCCD1}">
+              <a14:hiddenFill xmlns:a14="http://schemas.microsoft.com/office/drawing/2010/main">
+                <a:solidFill>
+                  <a:srgbClr val="FFFFFF"/>
+                </a:solidFill>
+              </a14:hiddenFill>
+            </a:ext>
+          </a:extLst>
+        </p:spPr>
+      </p:pic>
+      <p:sp>
+        <p:nvSpPr>
+          <p:cNvPr id="3" name="Content Placeholder 2"/>
+          <p:cNvSpPr>
+            <a:spLocks noGrp="1"/>
+          </p:cNvSpPr>
+          <p:nvPr>
+            <p:ph idx="1"/>
+          </p:nvPr>
+        </p:nvSpPr>
+        <p:spPr/>
+        <p:txBody>
+          <a:bodyPr>
+            <a:normAutofit lnSpcReduction="10000"/>
+          </a:bodyPr>
+          <a:lstStyle/>
+          <a:p>
+            <a:r>
+              <a:rPr lang="en-US" dirty="0" smtClean="0"/>
+              <a:t>Why can’t we build software like we build with block pieces? </a:t>
+            </a:r>
+          </a:p>
+          <a:p>
+            <a:r>
+              <a:rPr lang="en-US" sz="2400" dirty="0" smtClean="0"/>
+              <a:t>Unfortunately AOP does not make software design as easy as this concept, but it gets us closer to this way of building in several key ways.</a:t>
+            </a:r>
+          </a:p>
+          <a:p>
+            <a:pPr>
+              <a:buFont typeface="Wingdings" pitchFamily="2" charset="2"/>
+              <a:buChar char="Ø"/>
+            </a:pPr>
+            <a:r>
+              <a:rPr lang="en-US" sz="2400" dirty="0"/>
+              <a:t>	</a:t>
+            </a:r>
+            <a:r>
+              <a:rPr lang="en-US" sz="2400" dirty="0" smtClean="0">
+                <a:effectLst>
+                  <a:outerShdw blurRad="38100" dist="38100" dir="2700000" algn="tl">
+                    <a:srgbClr val="000000">
+                      <a:alpha val="43137"/>
+                    </a:srgbClr>
+                  </a:outerShdw>
+                </a:effectLst>
+              </a:rPr>
+              <a:t>Other than constructors, There are </a:t>
+            </a:r>
+            <a:r>
+              <a:rPr lang="en-US" sz="2400" b="1" dirty="0" smtClean="0">
+                <a:solidFill>
+                  <a:srgbClr val="FF0000"/>
+                </a:solidFill>
+                <a:effectLst>
+                  <a:outerShdw blurRad="38100" dist="38100" dir="2700000" algn="tl">
+                    <a:srgbClr val="000000">
+                      <a:alpha val="43137"/>
+                    </a:srgbClr>
+                  </a:outerShdw>
+                </a:effectLst>
+              </a:rPr>
+              <a:t>no parameters 	passed </a:t>
+            </a:r>
+            <a:r>
+              <a:rPr lang="en-US" sz="2400" dirty="0" smtClean="0">
+                <a:effectLst>
+                  <a:outerShdw blurRad="38100" dist="38100" dir="2700000" algn="tl">
+                    <a:srgbClr val="000000">
+                      <a:alpha val="43137"/>
+                    </a:srgbClr>
+                  </a:outerShdw>
+                </a:effectLst>
+              </a:rPr>
+              <a:t>in AOP.</a:t>
+            </a:r>
+          </a:p>
+          <a:p>
+            <a:pPr>
+              <a:buFont typeface="Wingdings" pitchFamily="2" charset="2"/>
+              <a:buChar char="Ø"/>
+            </a:pPr>
+            <a:r>
+              <a:rPr lang="en-US" sz="2400" dirty="0"/>
+              <a:t>	</a:t>
+            </a:r>
+            <a:r>
+              <a:rPr lang="en-US" sz="2400" dirty="0" smtClean="0">
+                <a:effectLst>
+                  <a:outerShdw blurRad="38100" dist="38100" dir="2700000" algn="tl">
+                    <a:srgbClr val="000000">
+                      <a:alpha val="43137"/>
+                    </a:srgbClr>
+                  </a:outerShdw>
+                </a:effectLst>
+              </a:rPr>
+              <a:t>Agents </a:t>
+            </a:r>
+            <a:r>
+              <a:rPr lang="en-US" sz="2400" b="1" dirty="0" smtClean="0">
+                <a:solidFill>
+                  <a:srgbClr val="FF0000"/>
+                </a:solidFill>
+                <a:effectLst>
+                  <a:outerShdw blurRad="38100" dist="38100" dir="2700000" algn="tl">
+                    <a:srgbClr val="000000">
+                      <a:alpha val="43137"/>
+                    </a:srgbClr>
+                  </a:outerShdw>
+                </a:effectLst>
+              </a:rPr>
+              <a:t>do not have dependencies in code </a:t>
+            </a:r>
+            <a:r>
+              <a:rPr lang="en-US" sz="2400" dirty="0" smtClean="0">
+                <a:effectLst>
+                  <a:outerShdw blurRad="38100" dist="38100" dir="2700000" algn="tl">
+                    <a:srgbClr val="000000">
+                      <a:alpha val="43137"/>
+                    </a:srgbClr>
+                  </a:outerShdw>
+                </a:effectLst>
+              </a:rPr>
+              <a:t>with 	one another (unless they are managers).</a:t>
+            </a:r>
+          </a:p>
+          <a:p>
+            <a:pPr>
+              <a:buFont typeface="Wingdings" pitchFamily="2" charset="2"/>
+              <a:buChar char="Ø"/>
+            </a:pPr>
+            <a:r>
+              <a:rPr lang="en-US" sz="2400" dirty="0">
+                <a:effectLst>
+                  <a:outerShdw blurRad="38100" dist="38100" dir="2700000" algn="tl">
+                    <a:srgbClr val="000000">
+                      <a:alpha val="43137"/>
+                    </a:srgbClr>
+                  </a:outerShdw>
+                </a:effectLst>
+              </a:rPr>
+              <a:t>	</a:t>
+            </a:r>
+            <a:r>
+              <a:rPr lang="en-US" sz="2400" dirty="0" smtClean="0">
+                <a:effectLst>
+                  <a:outerShdw blurRad="38100" dist="38100" dir="2700000" algn="tl">
+                    <a:srgbClr val="000000">
+                      <a:alpha val="43137"/>
+                    </a:srgbClr>
+                  </a:outerShdw>
+                </a:effectLst>
+              </a:rPr>
+              <a:t>Agents </a:t>
+            </a:r>
+            <a:r>
+              <a:rPr lang="en-US" sz="2400" b="1" dirty="0" smtClean="0">
+                <a:solidFill>
+                  <a:srgbClr val="FF0000"/>
+                </a:solidFill>
+                <a:effectLst>
+                  <a:outerShdw blurRad="38100" dist="38100" dir="2700000" algn="tl">
+                    <a:srgbClr val="000000">
+                      <a:alpha val="43137"/>
+                    </a:srgbClr>
+                  </a:outerShdw>
+                </a:effectLst>
+              </a:rPr>
+              <a:t>share a uniform interface</a:t>
+            </a:r>
+            <a:r>
+              <a:rPr lang="en-US" sz="2400" dirty="0" smtClean="0">
+                <a:effectLst>
+                  <a:outerShdw blurRad="38100" dist="38100" dir="2700000" algn="tl">
+                    <a:srgbClr val="000000">
+                      <a:alpha val="43137"/>
+                    </a:srgbClr>
+                  </a:outerShdw>
+                </a:effectLst>
+              </a:rPr>
+              <a:t>, allowing new 	features to be easily added by plugging in new 	agents to existing AOP software. </a:t>
+            </a:r>
+            <a:endParaRPr lang="en-US" sz="2400" dirty="0">
+              <a:effectLst>
+                <a:outerShdw blurRad="38100" dist="38100" dir="2700000" algn="tl">
+                  <a:srgbClr val="000000">
+                    <a:alpha val="43137"/>
+                  </a:srgbClr>
+                </a:outerShdw>
+              </a:effectLst>
+            </a:endParaRPr>
+          </a:p>
+        </p:txBody>
+      </p:sp>
+      <p:sp>
+        <p:nvSpPr>
+          <p:cNvPr id="4" name="TextBox 3"/>
+          <p:cNvSpPr txBox="1"/>
+          <p:nvPr/>
+        </p:nvSpPr>
+        <p:spPr>
+          <a:xfrm>
+            <a:off x="304800" y="6477000"/>
+            <a:ext cx="8534400" cy="369332"/>
+          </a:xfrm>
+          <a:prstGeom prst="rect">
+            <a:avLst/>
+          </a:prstGeom>
+          <a:noFill/>
+        </p:spPr>
+        <p:txBody>
+          <a:bodyPr wrap="square" rtlCol="0">
+            <a:spAutoFit/>
+          </a:bodyPr>
+          <a:lstStyle/>
+          <a:p>
+            <a:r>
+              <a:rPr lang="en-US" dirty="0" smtClean="0"/>
+              <a:t>Image source: (https</a:t>
+            </a:r>
+            <a:r>
+              <a:rPr lang="en-US" dirty="0"/>
+              <a:t>://pixabay.com/en/lego-lego-duplo-building-built-190704</a:t>
+            </a:r>
+            <a:r>
+              <a:rPr lang="en-US" dirty="0" smtClean="0"/>
+              <a:t>/)</a:t>
+            </a:r>
+            <a:endParaRPr lang="en-US" dirty="0"/>
+          </a:p>
+        </p:txBody>
+      </p:sp>
+    </p:spTree>
+    <p:extLst>
+      <p:ext uri="{BB962C8B-B14F-4D97-AF65-F5344CB8AC3E}">
+        <p14:creationId xmlns:p14="http://schemas.microsoft.com/office/powerpoint/2010/main" val="2335768888"/>
+      </p:ext>
+    </p:extLst>
+  </p:cSld>
+  <p:clrMapOvr>
+    <a:masterClrMapping/>
+  </p:clrMapOvr>
+  <p:timing>
+    <p:tnLst>
+      <p:par>
+        <p:cTn id="1" dur="indefinite" restart="never" nodeType="tmRoot">
+          <p:childTnLst>
+            <p:seq concurrent="1" nextAc="seek">
+              <p:cTn id="2" dur="indefinite" nodeType="mainSeq">
+                <p:childTnLst>
+                  <p:par>
+                    <p:cTn id="3" fill="hold">
+                      <p:stCondLst>
+                        <p:cond delay="indefinite"/>
+                      </p:stCondLst>
+                      <p:childTnLst>
+                        <p:par>
+                          <p:cTn id="4" fill="hold">
+                            <p:stCondLst>
+                              <p:cond delay="0"/>
+                            </p:stCondLst>
+                            <p:childTnLst>
+                              <p:par>
+                                <p:cTn id="5" presetID="10" presetClass="entr" presetSubtype="0" fill="hold" nodeType="clickEffect">
+                                  <p:stCondLst>
+                                    <p:cond delay="0"/>
+                                  </p:stCondLst>
+                                  <p:childTnLst>
+                                    <p:set>
+                                      <p:cBhvr>
+                                        <p:cTn id="6" dur="1" fill="hold">
+                                          <p:stCondLst>
+                                            <p:cond delay="0"/>
+                                          </p:stCondLst>
+                                        </p:cTn>
+                                        <p:tgtEl>
+                                          <p:spTgt spid="2050"/>
+                                        </p:tgtEl>
+                                        <p:attrNameLst>
+                                          <p:attrName>style.visibility</p:attrName>
+                                        </p:attrNameLst>
+                                      </p:cBhvr>
+                                      <p:to>
+                                        <p:strVal val="visible"/>
+                                      </p:to>
+                                    </p:set>
+                                    <p:animEffect transition="in" filter="fade">
+                                      <p:cBhvr>
+                                        <p:cTn id="7" dur="500"/>
+                                        <p:tgtEl>
+                                          <p:spTgt spid="2050"/>
+                                        </p:tgtEl>
+                                      </p:cBhvr>
+                                    </p:animEffect>
+                                  </p:childTnLst>
+                                </p:cTn>
+                              </p:par>
+                            </p:childTnLst>
+                          </p:cTn>
+                        </p:par>
+                      </p:childTnLst>
+                    </p:cTn>
+                  </p:par>
+                  <p:par>
+                    <p:cTn id="8" fill="hold">
+                      <p:stCondLst>
+                        <p:cond delay="indefinite"/>
+                      </p:stCondLst>
+                      <p:childTnLst>
+                        <p:par>
+                          <p:cTn id="9" fill="hold">
+                            <p:stCondLst>
+                              <p:cond delay="0"/>
+                            </p:stCondLst>
+                            <p:childTnLst>
+                              <p:par>
+                                <p:cTn id="10" presetID="10" presetClass="entr" presetSubtype="0" fill="hold" grpId="0" nodeType="clickEffect">
+                                  <p:stCondLst>
+                                    <p:cond delay="0"/>
+                                  </p:stCondLst>
+                                  <p:childTnLst>
+                                    <p:set>
+                                      <p:cBhvr>
+                                        <p:cTn id="11" dur="1" fill="hold">
+                                          <p:stCondLst>
+                                            <p:cond delay="0"/>
+                                          </p:stCondLst>
+                                        </p:cTn>
+                                        <p:tgtEl>
+                                          <p:spTgt spid="2"/>
+                                        </p:tgtEl>
+                                        <p:attrNameLst>
+                                          <p:attrName>style.visibility</p:attrName>
+                                        </p:attrNameLst>
+                                      </p:cBhvr>
+                                      <p:to>
+                                        <p:strVal val="visible"/>
+                                      </p:to>
+                                    </p:set>
+                                    <p:animEffect transition="in" filter="fade">
+                                      <p:cBhvr>
+                                        <p:cTn id="12" dur="500"/>
+                                        <p:tgtEl>
+                                          <p:spTgt spid="2"/>
+                                        </p:tgtEl>
+                                      </p:cBhvr>
+                                    </p:animEffect>
+                                  </p:childTnLst>
+                                </p:cTn>
+                              </p:par>
+                            </p:childTnLst>
+                          </p:cTn>
+                        </p:par>
+                      </p:childTnLst>
+                    </p:cTn>
+                  </p:par>
+                  <p:par>
+                    <p:cTn id="13" fill="hold">
+                      <p:stCondLst>
+                        <p:cond delay="indefinite"/>
+                      </p:stCondLst>
+                      <p:childTnLst>
+                        <p:par>
+                          <p:cTn id="14" fill="hold">
+                            <p:stCondLst>
+                              <p:cond delay="0"/>
+                            </p:stCondLst>
+                            <p:childTnLst>
+                              <p:par>
+                                <p:cTn id="15" presetID="10" presetClass="entr" presetSubtype="0" fill="hold" nodeType="clickEffect">
+                                  <p:stCondLst>
+                                    <p:cond delay="0"/>
+                                  </p:stCondLst>
+                                  <p:childTnLst>
+                                    <p:set>
+                                      <p:cBhvr>
+                                        <p:cTn id="16" dur="1" fill="hold">
+                                          <p:stCondLst>
+                                            <p:cond delay="0"/>
+                                          </p:stCondLst>
+                                        </p:cTn>
+                                        <p:tgtEl>
+                                          <p:spTgt spid="3">
+                                            <p:txEl>
+                                              <p:pRg st="0" end="0"/>
+                                            </p:txEl>
+                                          </p:spTgt>
+                                        </p:tgtEl>
+                                        <p:attrNameLst>
+                                          <p:attrName>style.visibility</p:attrName>
+                                        </p:attrNameLst>
+                                      </p:cBhvr>
+                                      <p:to>
+                                        <p:strVal val="visible"/>
+                                      </p:to>
+                                    </p:set>
+                                    <p:animEffect transition="in" filter="fade">
+                                      <p:cBhvr>
+                                        <p:cTn id="17" dur="500"/>
+                                        <p:tgtEl>
+                                          <p:spTgt spid="3">
+                                            <p:txEl>
+                                              <p:pRg st="0" end="0"/>
+                                            </p:txEl>
+                                          </p:spTgt>
+                                        </p:tgtEl>
+                                      </p:cBhvr>
+                                    </p:animEffect>
+                                  </p:childTnLst>
+                                </p:cTn>
+                              </p:par>
+                            </p:childTnLst>
+                          </p:cTn>
+                        </p:par>
+                      </p:childTnLst>
+                    </p:cTn>
+                  </p:par>
+                  <p:par>
+                    <p:cTn id="18" fill="hold">
+                      <p:stCondLst>
+                        <p:cond delay="indefinite"/>
+                      </p:stCondLst>
+                      <p:childTnLst>
+                        <p:par>
+                          <p:cTn id="19" fill="hold">
+                            <p:stCondLst>
+                              <p:cond delay="0"/>
+                            </p:stCondLst>
+                            <p:childTnLst>
+                              <p:par>
+                                <p:cTn id="20" presetID="10" presetClass="entr" presetSubtype="0" fill="hold" nodeType="clickEffect">
+                                  <p:stCondLst>
+                                    <p:cond delay="0"/>
+                                  </p:stCondLst>
+                                  <p:childTnLst>
+                                    <p:set>
+                                      <p:cBhvr>
+                                        <p:cTn id="21" dur="1" fill="hold">
+                                          <p:stCondLst>
+                                            <p:cond delay="0"/>
+                                          </p:stCondLst>
+                                        </p:cTn>
+                                        <p:tgtEl>
+                                          <p:spTgt spid="3">
+                                            <p:txEl>
+                                              <p:pRg st="1" end="1"/>
+                                            </p:txEl>
+                                          </p:spTgt>
+                                        </p:tgtEl>
+                                        <p:attrNameLst>
+                                          <p:attrName>style.visibility</p:attrName>
+                                        </p:attrNameLst>
+                                      </p:cBhvr>
+                                      <p:to>
+                                        <p:strVal val="visible"/>
+                                      </p:to>
+                                    </p:set>
+                                    <p:animEffect transition="in" filter="fade">
+                                      <p:cBhvr>
+                                        <p:cTn id="22" dur="500"/>
+                                        <p:tgtEl>
+                                          <p:spTgt spid="3">
+                                            <p:txEl>
+                                              <p:pRg st="1" end="1"/>
+                                            </p:txEl>
+                                          </p:spTgt>
+                                        </p:tgtEl>
+                                      </p:cBhvr>
+                                    </p:animEffect>
+                                  </p:childTnLst>
+                                </p:cTn>
+                              </p:par>
+                              <p:par>
+                                <p:cTn id="23" presetID="10" presetClass="entr" presetSubtype="0" fill="hold" grpId="0" nodeType="withEffect">
+                                  <p:stCondLst>
+                                    <p:cond delay="0"/>
+                                  </p:stCondLst>
+                                  <p:childTnLst>
+                                    <p:set>
+                                      <p:cBhvr>
+                                        <p:cTn id="24" dur="1" fill="hold">
+                                          <p:stCondLst>
+                                            <p:cond delay="0"/>
+                                          </p:stCondLst>
+                                        </p:cTn>
+                                        <p:tgtEl>
+                                          <p:spTgt spid="4"/>
+                                        </p:tgtEl>
+                                        <p:attrNameLst>
+                                          <p:attrName>style.visibility</p:attrName>
+                                        </p:attrNameLst>
+                                      </p:cBhvr>
+                                      <p:to>
+                                        <p:strVal val="visible"/>
+                                      </p:to>
+                                    </p:set>
+                                    <p:animEffect transition="in" filter="fade">
+                                      <p:cBhvr>
+                                        <p:cTn id="25" dur="500"/>
+                                        <p:tgtEl>
+                                          <p:spTgt spid="4"/>
+                                        </p:tgtEl>
+                                      </p:cBhvr>
+                                    </p:animEffect>
+                                  </p:childTnLst>
+                                </p:cTn>
+                              </p:par>
+                            </p:childTnLst>
+                          </p:cTn>
+                        </p:par>
+                      </p:childTnLst>
+                    </p:cTn>
+                  </p:par>
+                  <p:par>
+                    <p:cTn id="26" fill="hold">
+                      <p:stCondLst>
+                        <p:cond delay="indefinite"/>
+                      </p:stCondLst>
+                      <p:childTnLst>
+                        <p:par>
+                          <p:cTn id="27" fill="hold">
+                            <p:stCondLst>
+                              <p:cond delay="0"/>
+                            </p:stCondLst>
+                            <p:childTnLst>
+                              <p:par>
+                                <p:cTn id="28" presetID="10" presetClass="exit" presetSubtype="0" fill="hold" grpId="1" nodeType="clickEffect">
+                                  <p:stCondLst>
+                                    <p:cond delay="0"/>
+                                  </p:stCondLst>
+                                  <p:childTnLst>
+                                    <p:animEffect transition="out" filter="fade">
+                                      <p:cBhvr>
+                                        <p:cTn id="29" dur="500"/>
+                                        <p:tgtEl>
+                                          <p:spTgt spid="4"/>
+                                        </p:tgtEl>
+                                      </p:cBhvr>
+                                    </p:animEffect>
+                                    <p:set>
+                                      <p:cBhvr>
+                                        <p:cTn id="30" dur="1" fill="hold">
+                                          <p:stCondLst>
+                                            <p:cond delay="499"/>
+                                          </p:stCondLst>
+                                        </p:cTn>
+                                        <p:tgtEl>
+                                          <p:spTgt spid="4"/>
+                                        </p:tgtEl>
+                                        <p:attrNameLst>
+                                          <p:attrName>style.visibility</p:attrName>
+                                        </p:attrNameLst>
+                                      </p:cBhvr>
+                                      <p:to>
+                                        <p:strVal val="hidden"/>
+                                      </p:to>
+                                    </p:set>
+                                  </p:childTnLst>
+                                </p:cTn>
+                              </p:par>
+                              <p:par>
+                                <p:cTn id="31" presetID="10" presetClass="exit" presetSubtype="0" fill="hold" nodeType="withEffect">
+                                  <p:stCondLst>
+                                    <p:cond delay="0"/>
+                                  </p:stCondLst>
+                                  <p:childTnLst>
+                                    <p:animEffect transition="out" filter="fade">
+                                      <p:cBhvr>
+                                        <p:cTn id="32" dur="500"/>
+                                        <p:tgtEl>
+                                          <p:spTgt spid="2050"/>
+                                        </p:tgtEl>
+                                      </p:cBhvr>
+                                    </p:animEffect>
+                                    <p:set>
+                                      <p:cBhvr>
+                                        <p:cTn id="33" dur="1" fill="hold">
+                                          <p:stCondLst>
+                                            <p:cond delay="499"/>
+                                          </p:stCondLst>
+                                        </p:cTn>
+                                        <p:tgtEl>
+                                          <p:spTgt spid="2050"/>
+                                        </p:tgtEl>
+                                        <p:attrNameLst>
+                                          <p:attrName>style.visibility</p:attrName>
+                                        </p:attrNameLst>
+                                      </p:cBhvr>
+                                      <p:to>
+                                        <p:strVal val="hidden"/>
+                                      </p:to>
+                                    </p:set>
+                                  </p:childTnLst>
+                                </p:cTn>
+                              </p:par>
+                            </p:childTnLst>
+                          </p:cTn>
+                        </p:par>
+                      </p:childTnLst>
+                    </p:cTn>
+                  </p:par>
+                  <p:par>
+                    <p:cTn id="34" fill="hold">
+                      <p:stCondLst>
+                        <p:cond delay="indefinite"/>
+                      </p:stCondLst>
+                      <p:childTnLst>
+                        <p:par>
+                          <p:cTn id="35" fill="hold">
+                            <p:stCondLst>
+                              <p:cond delay="0"/>
+                            </p:stCondLst>
+                            <p:childTnLst>
+                              <p:par>
+                                <p:cTn id="36" presetID="10" presetClass="entr" presetSubtype="0" fill="hold" nodeType="clickEffect">
+                                  <p:stCondLst>
+                                    <p:cond delay="0"/>
+                                  </p:stCondLst>
+                                  <p:childTnLst>
+                                    <p:set>
+                                      <p:cBhvr>
+                                        <p:cTn id="37" dur="1" fill="hold">
+                                          <p:stCondLst>
+                                            <p:cond delay="0"/>
+                                          </p:stCondLst>
+                                        </p:cTn>
+                                        <p:tgtEl>
+                                          <p:spTgt spid="3">
+                                            <p:txEl>
+                                              <p:pRg st="2" end="2"/>
+                                            </p:txEl>
+                                          </p:spTgt>
+                                        </p:tgtEl>
+                                        <p:attrNameLst>
+                                          <p:attrName>style.visibility</p:attrName>
+                                        </p:attrNameLst>
+                                      </p:cBhvr>
+                                      <p:to>
+                                        <p:strVal val="visible"/>
+                                      </p:to>
+                                    </p:set>
+                                    <p:animEffect transition="in" filter="fade">
+                                      <p:cBhvr>
+                                        <p:cTn id="38" dur="500"/>
+                                        <p:tgtEl>
+                                          <p:spTgt spid="3">
+                                            <p:txEl>
+                                              <p:pRg st="2" end="2"/>
+                                            </p:txEl>
+                                          </p:spTgt>
+                                        </p:tgtEl>
+                                      </p:cBhvr>
+                                    </p:animEffect>
+                                  </p:childTnLst>
+                                </p:cTn>
+                              </p:par>
+                            </p:childTnLst>
+                          </p:cTn>
+                        </p:par>
+                      </p:childTnLst>
+                    </p:cTn>
+                  </p:par>
+                  <p:par>
+                    <p:cTn id="39" fill="hold">
+                      <p:stCondLst>
+                        <p:cond delay="indefinite"/>
+                      </p:stCondLst>
+                      <p:childTnLst>
+                        <p:par>
+                          <p:cTn id="40" fill="hold">
+                            <p:stCondLst>
+                              <p:cond delay="0"/>
+                            </p:stCondLst>
+                            <p:childTnLst>
+                              <p:par>
+                                <p:cTn id="41" presetID="10" presetClass="entr" presetSubtype="0" fill="hold" nodeType="clickEffect">
+                                  <p:stCondLst>
+                                    <p:cond delay="0"/>
+                                  </p:stCondLst>
+                                  <p:childTnLst>
+                                    <p:set>
+                                      <p:cBhvr>
+                                        <p:cTn id="42" dur="1" fill="hold">
+                                          <p:stCondLst>
+                                            <p:cond delay="0"/>
+                                          </p:stCondLst>
+                                        </p:cTn>
+                                        <p:tgtEl>
+                                          <p:spTgt spid="3">
+                                            <p:txEl>
+                                              <p:pRg st="3" end="3"/>
+                                            </p:txEl>
+                                          </p:spTgt>
+                                        </p:tgtEl>
+                                        <p:attrNameLst>
+                                          <p:attrName>style.visibility</p:attrName>
+                                        </p:attrNameLst>
+                                      </p:cBhvr>
+                                      <p:to>
+                                        <p:strVal val="visible"/>
+                                      </p:to>
+                                    </p:set>
+                                    <p:animEffect transition="in" filter="fade">
+                                      <p:cBhvr>
+                                        <p:cTn id="43" dur="500"/>
+                                        <p:tgtEl>
+                                          <p:spTgt spid="3">
+                                            <p:txEl>
+                                              <p:pRg st="3" end="3"/>
+                                            </p:txEl>
+                                          </p:spTgt>
+                                        </p:tgtEl>
+                                      </p:cBhvr>
+                                    </p:animEffect>
+                                  </p:childTnLst>
+                                </p:cTn>
+                              </p:par>
+                            </p:childTnLst>
+                          </p:cTn>
+                        </p:par>
+                      </p:childTnLst>
+                    </p:cTn>
+                  </p:par>
+                  <p:par>
+                    <p:cTn id="44" fill="hold">
+                      <p:stCondLst>
+                        <p:cond delay="indefinite"/>
+                      </p:stCondLst>
+                      <p:childTnLst>
+                        <p:par>
+                          <p:cTn id="45" fill="hold">
+                            <p:stCondLst>
+                              <p:cond delay="0"/>
+                            </p:stCondLst>
+                            <p:childTnLst>
+                              <p:par>
+                                <p:cTn id="46" presetID="10" presetClass="entr" presetSubtype="0" fill="hold" nodeType="clickEffect">
+                                  <p:stCondLst>
+                                    <p:cond delay="0"/>
+                                  </p:stCondLst>
+                                  <p:childTnLst>
+                                    <p:set>
+                                      <p:cBhvr>
+                                        <p:cTn id="47" dur="1" fill="hold">
+                                          <p:stCondLst>
+                                            <p:cond delay="0"/>
+                                          </p:stCondLst>
+                                        </p:cTn>
+                                        <p:tgtEl>
+                                          <p:spTgt spid="3">
+                                            <p:txEl>
+                                              <p:pRg st="4" end="4"/>
+                                            </p:txEl>
+                                          </p:spTgt>
+                                        </p:tgtEl>
+                                        <p:attrNameLst>
+                                          <p:attrName>style.visibility</p:attrName>
+                                        </p:attrNameLst>
+                                      </p:cBhvr>
+                                      <p:to>
+                                        <p:strVal val="visible"/>
+                                      </p:to>
+                                    </p:set>
+                                    <p:animEffect transition="in" filter="fade">
+                                      <p:cBhvr>
+                                        <p:cTn id="48" dur="500"/>
+                                        <p:tgtEl>
+                                          <p:spTgt spid="3">
+                                            <p:txEl>
+                                              <p:pRg st="4" end="4"/>
+                                            </p:txEl>
+                                          </p:spTgt>
+                                        </p:tgtEl>
+                                      </p:cBhvr>
+                                    </p:animEffect>
+                                  </p:childTnLst>
+                                </p:cTn>
+                              </p:par>
+                            </p:childTnLst>
+                          </p:cTn>
+                        </p:par>
+                      </p:childTnLst>
+                    </p:cTn>
+                  </p:par>
+                </p:childTnLst>
+              </p:cTn>
+              <p:prevCondLst>
+                <p:cond evt="onPrev" delay="0">
+                  <p:tgtEl>
+                    <p:sldTgt/>
+                  </p:tgtEl>
+                </p:cond>
+              </p:prevCondLst>
+              <p:nextCondLst>
+                <p:cond evt="onNext" delay="0">
+                  <p:tgtEl>
+                    <p:sldTgt/>
+                  </p:tgtEl>
+                </p:cond>
+              </p:nextCondLst>
+            </p:seq>
+          </p:childTnLst>
+        </p:cTn>
+      </p:par>
+    </p:tnLst>
+    <p:bldLst>
+      <p:bldP spid="2" grpId="0"/>
+      <p:bldP spid="4" grpId="0"/>
+      <p:bldP spid="4" grpId="1"/>
+    </p:bldLst>
+  </p:timing>
+</p:sld>
+</file>
+
+<file path=ppt/slides/slide12.xml><?xml version="1.0" encoding="utf-8"?>
+<p:sld xmlns:a="http://schemas.openxmlformats.org/drawingml/2006/main" xmlns:r="http://schemas.openxmlformats.org/officeDocument/2006/relationships" xmlns:p="http://schemas.openxmlformats.org/presentationml/2006/main">
+  <p:cSld>
+    <p:spTree>
+      <p:nvGrpSpPr>
+        <p:cNvPr id="1" name=""/>
+        <p:cNvGrpSpPr/>
+        <p:nvPr/>
+      </p:nvGrpSpPr>
+      <p:grpSpPr>
+        <a:xfrm>
+          <a:off x="0" y="0"/>
+          <a:ext cx="0" cy="0"/>
+          <a:chOff x="0" y="0"/>
+          <a:chExt cx="0" cy="0"/>
+        </a:xfrm>
+      </p:grpSpPr>
+      <p:sp>
+        <p:nvSpPr>
+          <p:cNvPr id="2" name="Title 1"/>
+          <p:cNvSpPr>
+            <a:spLocks noGrp="1"/>
+          </p:cNvSpPr>
+          <p:nvPr>
+            <p:ph type="title"/>
+          </p:nvPr>
+        </p:nvSpPr>
+        <p:spPr/>
+        <p:txBody>
           <a:bodyPr>
             <a:normAutofit fontScale="90000"/>
           </a:bodyPr>
@@ -3951,7 +4837,7 @@
         <p:spPr>
           <a:xfrm>
             <a:off x="457200" y="1600200"/>
-            <a:ext cx="8229600" cy="4419600"/>
+            <a:ext cx="8229600" cy="4267200"/>
           </a:xfrm>
         </p:spPr>
         <p:txBody>
@@ -3962,13 +4848,20 @@
           <a:p>
             <a:r>
               <a:rPr lang="en-US" dirty="0" smtClean="0"/>
-              <a:t>When you divide your program into agents with goal-oriented tasks, you set up software that can learn how to improve its performance during runtime, and adapt to its environment.</a:t>
-            </a:r>
-          </a:p>
-          <a:p>
-            <a:pPr marL="137160" indent="0">
-              <a:buNone/>
-            </a:pPr>
+              <a:t>When you divide your program into agents with goal-oriented tasks, you set </a:t>
+            </a:r>
+            <a:r>
+              <a:rPr lang="en-US" dirty="0" smtClean="0"/>
+              <a:t>up the foundation for </a:t>
+            </a:r>
+            <a:r>
+              <a:rPr lang="en-US" dirty="0" smtClean="0"/>
+              <a:t>software that can learn how to improve its performance during runtime, and adapt to its environment</a:t>
+            </a:r>
+            <a:r>
+              <a:rPr lang="en-US" dirty="0" smtClean="0"/>
+              <a:t>.</a:t>
+            </a:r>
             <a:endParaRPr lang="en-US" dirty="0" smtClean="0"/>
           </a:p>
           <a:p>
@@ -4297,7 +5190,7 @@
                                         <p:tgtEl>
                                           <p:spTgt spid="3">
                                             <p:txEl>
-                                              <p:pRg st="2" end="2"/>
+                                              <p:pRg st="1" end="1"/>
                                             </p:txEl>
                                           </p:spTgt>
                                         </p:tgtEl>
@@ -4315,7 +5208,7 @@
                                         <p:tgtEl>
                                           <p:spTgt spid="3">
                                             <p:txEl>
-                                              <p:pRg st="2" end="2"/>
+                                              <p:pRg st="1" end="1"/>
                                             </p:txEl>
                                           </p:spTgt>
                                         </p:tgtEl>
@@ -4358,7 +5251,7 @@
                                         <p:tgtEl>
                                           <p:spTgt spid="3">
                                             <p:txEl>
-                                              <p:pRg st="3" end="3"/>
+                                              <p:pRg st="2" end="2"/>
                                             </p:txEl>
                                           </p:spTgt>
                                         </p:tgtEl>
@@ -4376,7 +5269,7 @@
                                         <p:tgtEl>
                                           <p:spTgt spid="3">
                                             <p:txEl>
-                                              <p:pRg st="3" end="3"/>
+                                              <p:pRg st="2" end="2"/>
                                             </p:txEl>
                                           </p:spTgt>
                                         </p:tgtEl>
@@ -4419,7 +5312,7 @@
                                         <p:tgtEl>
                                           <p:spTgt spid="3">
                                             <p:txEl>
-                                              <p:pRg st="4" end="4"/>
+                                              <p:pRg st="3" end="3"/>
                                             </p:txEl>
                                           </p:spTgt>
                                         </p:tgtEl>
@@ -4437,7 +5330,7 @@
                                         <p:tgtEl>
                                           <p:spTgt spid="3">
                                             <p:txEl>
-                                              <p:pRg st="4" end="4"/>
+                                              <p:pRg st="3" end="3"/>
                                             </p:txEl>
                                           </p:spTgt>
                                         </p:tgtEl>
@@ -4480,7 +5373,7 @@
                                         <p:tgtEl>
                                           <p:spTgt spid="3">
                                             <p:txEl>
-                                              <p:pRg st="6" end="6"/>
+                                              <p:pRg st="5" end="5"/>
                                             </p:txEl>
                                           </p:spTgt>
                                         </p:tgtEl>
@@ -4498,7 +5391,7 @@
                                         <p:tgtEl>
                                           <p:spTgt spid="3">
                                             <p:txEl>
-                                              <p:pRg st="6" end="6"/>
+                                              <p:pRg st="5" end="5"/>
                                             </p:txEl>
                                           </p:spTgt>
                                         </p:tgtEl>
@@ -4554,593 +5447,6 @@
                                         <p:cTn id="37" dur="2000"/>
                                         <p:tgtEl>
                                           <p:spTgt spid="5"/>
-                                        </p:tgtEl>
-                                      </p:cBhvr>
-                                    </p:animEffect>
-                                  </p:childTnLst>
-                                </p:cTn>
-                              </p:par>
-                            </p:childTnLst>
-                          </p:cTn>
-                        </p:par>
-                      </p:childTnLst>
-                    </p:cTn>
-                  </p:par>
-                </p:childTnLst>
-              </p:cTn>
-              <p:prevCondLst>
-                <p:cond evt="onPrev" delay="0">
-                  <p:tgtEl>
-                    <p:sldTgt/>
-                  </p:tgtEl>
-                </p:cond>
-              </p:prevCondLst>
-              <p:nextCondLst>
-                <p:cond evt="onNext" delay="0">
-                  <p:tgtEl>
-                    <p:sldTgt/>
-                  </p:tgtEl>
-                </p:cond>
-              </p:nextCondLst>
-            </p:seq>
-          </p:childTnLst>
-        </p:cTn>
-      </p:par>
-    </p:tnLst>
-    <p:bldLst>
-      <p:bldP spid="2" grpId="0"/>
-      <p:bldP spid="3" grpId="0" build="p"/>
-    </p:bldLst>
-  </p:timing>
-</p:sld>
-</file>
-
-<file path=ppt/slides/slide12.xml><?xml version="1.0" encoding="utf-8"?>
-<p:sld xmlns:a="http://schemas.openxmlformats.org/drawingml/2006/main" xmlns:r="http://schemas.openxmlformats.org/officeDocument/2006/relationships" xmlns:p="http://schemas.openxmlformats.org/presentationml/2006/main">
-  <p:cSld>
-    <p:spTree>
-      <p:nvGrpSpPr>
-        <p:cNvPr id="1" name=""/>
-        <p:cNvGrpSpPr/>
-        <p:nvPr/>
-      </p:nvGrpSpPr>
-      <p:grpSpPr>
-        <a:xfrm>
-          <a:off x="0" y="0"/>
-          <a:ext cx="0" cy="0"/>
-          <a:chOff x="0" y="0"/>
-          <a:chExt cx="0" cy="0"/>
-        </a:xfrm>
-      </p:grpSpPr>
-      <p:sp>
-        <p:nvSpPr>
-          <p:cNvPr id="2" name="Title 1"/>
-          <p:cNvSpPr>
-            <a:spLocks noGrp="1"/>
-          </p:cNvSpPr>
-          <p:nvPr>
-            <p:ph type="title"/>
-          </p:nvPr>
-        </p:nvSpPr>
-        <p:spPr>
-          <a:xfrm>
-            <a:off x="381000" y="274638"/>
-            <a:ext cx="8305800" cy="1249362"/>
-          </a:xfrm>
-        </p:spPr>
-        <p:txBody>
-          <a:bodyPr>
-            <a:normAutofit fontScale="90000"/>
-          </a:bodyPr>
-          <a:lstStyle/>
-          <a:p>
-            <a:r>
-              <a:rPr lang="en-US" dirty="0" smtClean="0"/>
-              <a:t>Our semester project:</a:t>
-            </a:r>
-            <a:br>
-              <a:rPr lang="en-US" dirty="0" smtClean="0"/>
-            </a:br>
-            <a:r>
-              <a:rPr lang="en-US" dirty="0" smtClean="0"/>
-              <a:t>Developing a framework library</a:t>
-            </a:r>
-            <a:endParaRPr lang="en-US" dirty="0"/>
-          </a:p>
-        </p:txBody>
-      </p:sp>
-      <p:sp>
-        <p:nvSpPr>
-          <p:cNvPr id="3" name="Content Placeholder 2"/>
-          <p:cNvSpPr>
-            <a:spLocks noGrp="1"/>
-          </p:cNvSpPr>
-          <p:nvPr>
-            <p:ph idx="1"/>
-          </p:nvPr>
-        </p:nvSpPr>
-        <p:spPr/>
-        <p:txBody>
-          <a:bodyPr/>
-          <a:lstStyle/>
-          <a:p>
-            <a:r>
-              <a:rPr lang="en-US" dirty="0" smtClean="0"/>
-              <a:t>This semester (fall 2017) we will be building a library that implements AOP design in order to make software easier and safer to develop.</a:t>
-            </a:r>
-          </a:p>
-          <a:p>
-            <a:r>
-              <a:rPr lang="en-US" dirty="0" smtClean="0"/>
-              <a:t>You have the opportunity to contribute to the details of how this model could and will work in actual software.</a:t>
-            </a:r>
-          </a:p>
-          <a:p>
-            <a:r>
-              <a:rPr lang="en-US" dirty="0" smtClean="0"/>
-              <a:t>Such details include:</a:t>
-            </a:r>
-          </a:p>
-          <a:p>
-            <a:pPr marL="137160" indent="0">
-              <a:buNone/>
-            </a:pPr>
-            <a:r>
-              <a:rPr lang="en-US" sz="1800" dirty="0" smtClean="0"/>
-              <a:t>- how an agent class interfaces and learns from an environment class</a:t>
-            </a:r>
-          </a:p>
-          <a:p>
-            <a:pPr marL="137160" indent="0">
-              <a:buNone/>
-            </a:pPr>
-            <a:r>
-              <a:rPr lang="en-US" sz="1800" dirty="0" smtClean="0"/>
-              <a:t>- how agents communicate with each other to complete tasks at runtime</a:t>
-            </a:r>
-          </a:p>
-          <a:p>
-            <a:pPr marL="137160" indent="0">
-              <a:buNone/>
-            </a:pPr>
-            <a:r>
-              <a:rPr lang="en-US" sz="1800" dirty="0" smtClean="0"/>
-              <a:t>- how agents can handle common errors gracefully and intelligently</a:t>
-            </a:r>
-          </a:p>
-          <a:p>
-            <a:pPr marL="137160" indent="0">
-              <a:buNone/>
-            </a:pPr>
-            <a:endParaRPr lang="en-US" dirty="0"/>
-          </a:p>
-        </p:txBody>
-      </p:sp>
-    </p:spTree>
-    <p:extLst>
-      <p:ext uri="{BB962C8B-B14F-4D97-AF65-F5344CB8AC3E}">
-        <p14:creationId xmlns:p14="http://schemas.microsoft.com/office/powerpoint/2010/main" val="3316632516"/>
-      </p:ext>
-    </p:extLst>
-  </p:cSld>
-  <p:clrMapOvr>
-    <a:masterClrMapping/>
-  </p:clrMapOvr>
-  <p:timing>
-    <p:tnLst>
-      <p:par>
-        <p:cTn id="1" dur="indefinite" restart="never" nodeType="tmRoot">
-          <p:childTnLst>
-            <p:seq concurrent="1" nextAc="seek">
-              <p:cTn id="2" dur="indefinite" nodeType="mainSeq">
-                <p:childTnLst>
-                  <p:par>
-                    <p:cTn id="3" fill="hold">
-                      <p:stCondLst>
-                        <p:cond delay="indefinite"/>
-                      </p:stCondLst>
-                      <p:childTnLst>
-                        <p:par>
-                          <p:cTn id="4" fill="hold">
-                            <p:stCondLst>
-                              <p:cond delay="0"/>
-                            </p:stCondLst>
-                            <p:childTnLst>
-                              <p:par>
-                                <p:cTn id="5" presetID="10" presetClass="entr" presetSubtype="0" fill="hold" grpId="0" nodeType="clickEffect">
-                                  <p:stCondLst>
-                                    <p:cond delay="0"/>
-                                  </p:stCondLst>
-                                  <p:childTnLst>
-                                    <p:set>
-                                      <p:cBhvr>
-                                        <p:cTn id="6" dur="1" fill="hold">
-                                          <p:stCondLst>
-                                            <p:cond delay="0"/>
-                                          </p:stCondLst>
-                                        </p:cTn>
-                                        <p:tgtEl>
-                                          <p:spTgt spid="2"/>
-                                        </p:tgtEl>
-                                        <p:attrNameLst>
-                                          <p:attrName>style.visibility</p:attrName>
-                                        </p:attrNameLst>
-                                      </p:cBhvr>
-                                      <p:to>
-                                        <p:strVal val="visible"/>
-                                      </p:to>
-                                    </p:set>
-                                    <p:animEffect transition="in" filter="fade">
-                                      <p:cBhvr>
-                                        <p:cTn id="7" dur="500"/>
-                                        <p:tgtEl>
-                                          <p:spTgt spid="2"/>
-                                        </p:tgtEl>
-                                      </p:cBhvr>
-                                    </p:animEffect>
-                                  </p:childTnLst>
-                                </p:cTn>
-                              </p:par>
-                            </p:childTnLst>
-                          </p:cTn>
-                        </p:par>
-                      </p:childTnLst>
-                    </p:cTn>
-                  </p:par>
-                  <p:par>
-                    <p:cTn id="8" fill="hold">
-                      <p:stCondLst>
-                        <p:cond delay="indefinite"/>
-                      </p:stCondLst>
-                      <p:childTnLst>
-                        <p:par>
-                          <p:cTn id="9" fill="hold">
-                            <p:stCondLst>
-                              <p:cond delay="0"/>
-                            </p:stCondLst>
-                            <p:childTnLst>
-                              <p:par>
-                                <p:cTn id="10" presetID="10" presetClass="entr" presetSubtype="0" fill="hold" grpId="0" nodeType="clickEffect">
-                                  <p:stCondLst>
-                                    <p:cond delay="0"/>
-                                  </p:stCondLst>
-                                  <p:childTnLst>
-                                    <p:set>
-                                      <p:cBhvr>
-                                        <p:cTn id="11" dur="1" fill="hold">
-                                          <p:stCondLst>
-                                            <p:cond delay="0"/>
-                                          </p:stCondLst>
-                                        </p:cTn>
-                                        <p:tgtEl>
-                                          <p:spTgt spid="3">
-                                            <p:txEl>
-                                              <p:pRg st="0" end="0"/>
-                                            </p:txEl>
-                                          </p:spTgt>
-                                        </p:tgtEl>
-                                        <p:attrNameLst>
-                                          <p:attrName>style.visibility</p:attrName>
-                                        </p:attrNameLst>
-                                      </p:cBhvr>
-                                      <p:to>
-                                        <p:strVal val="visible"/>
-                                      </p:to>
-                                    </p:set>
-                                    <p:animEffect transition="in" filter="fade">
-                                      <p:cBhvr>
-                                        <p:cTn id="12" dur="500"/>
-                                        <p:tgtEl>
-                                          <p:spTgt spid="3">
-                                            <p:txEl>
-                                              <p:pRg st="0" end="0"/>
-                                            </p:txEl>
-                                          </p:spTgt>
-                                        </p:tgtEl>
-                                      </p:cBhvr>
-                                    </p:animEffect>
-                                  </p:childTnLst>
-                                </p:cTn>
-                              </p:par>
-                            </p:childTnLst>
-                          </p:cTn>
-                        </p:par>
-                      </p:childTnLst>
-                    </p:cTn>
-                  </p:par>
-                  <p:par>
-                    <p:cTn id="13" fill="hold">
-                      <p:stCondLst>
-                        <p:cond delay="indefinite"/>
-                      </p:stCondLst>
-                      <p:childTnLst>
-                        <p:par>
-                          <p:cTn id="14" fill="hold">
-                            <p:stCondLst>
-                              <p:cond delay="0"/>
-                            </p:stCondLst>
-                            <p:childTnLst>
-                              <p:par>
-                                <p:cTn id="15" presetID="10" presetClass="entr" presetSubtype="0" fill="hold" grpId="0" nodeType="clickEffect">
-                                  <p:stCondLst>
-                                    <p:cond delay="0"/>
-                                  </p:stCondLst>
-                                  <p:childTnLst>
-                                    <p:set>
-                                      <p:cBhvr>
-                                        <p:cTn id="16" dur="1" fill="hold">
-                                          <p:stCondLst>
-                                            <p:cond delay="0"/>
-                                          </p:stCondLst>
-                                        </p:cTn>
-                                        <p:tgtEl>
-                                          <p:spTgt spid="3">
-                                            <p:txEl>
-                                              <p:pRg st="1" end="1"/>
-                                            </p:txEl>
-                                          </p:spTgt>
-                                        </p:tgtEl>
-                                        <p:attrNameLst>
-                                          <p:attrName>style.visibility</p:attrName>
-                                        </p:attrNameLst>
-                                      </p:cBhvr>
-                                      <p:to>
-                                        <p:strVal val="visible"/>
-                                      </p:to>
-                                    </p:set>
-                                    <p:animEffect transition="in" filter="fade">
-                                      <p:cBhvr>
-                                        <p:cTn id="17" dur="500"/>
-                                        <p:tgtEl>
-                                          <p:spTgt spid="3">
-                                            <p:txEl>
-                                              <p:pRg st="1" end="1"/>
-                                            </p:txEl>
-                                          </p:spTgt>
-                                        </p:tgtEl>
-                                      </p:cBhvr>
-                                    </p:animEffect>
-                                  </p:childTnLst>
-                                </p:cTn>
-                              </p:par>
-                            </p:childTnLst>
-                          </p:cTn>
-                        </p:par>
-                      </p:childTnLst>
-                    </p:cTn>
-                  </p:par>
-                  <p:par>
-                    <p:cTn id="18" fill="hold">
-                      <p:stCondLst>
-                        <p:cond delay="indefinite"/>
-                      </p:stCondLst>
-                      <p:childTnLst>
-                        <p:par>
-                          <p:cTn id="19" fill="hold">
-                            <p:stCondLst>
-                              <p:cond delay="0"/>
-                            </p:stCondLst>
-                            <p:childTnLst>
-                              <p:par>
-                                <p:cTn id="20" presetID="10" presetClass="entr" presetSubtype="0" fill="hold" grpId="0" nodeType="clickEffect">
-                                  <p:stCondLst>
-                                    <p:cond delay="0"/>
-                                  </p:stCondLst>
-                                  <p:childTnLst>
-                                    <p:set>
-                                      <p:cBhvr>
-                                        <p:cTn id="21" dur="1" fill="hold">
-                                          <p:stCondLst>
-                                            <p:cond delay="0"/>
-                                          </p:stCondLst>
-                                        </p:cTn>
-                                        <p:tgtEl>
-                                          <p:spTgt spid="3">
-                                            <p:txEl>
-                                              <p:pRg st="2" end="2"/>
-                                            </p:txEl>
-                                          </p:spTgt>
-                                        </p:tgtEl>
-                                        <p:attrNameLst>
-                                          <p:attrName>style.visibility</p:attrName>
-                                        </p:attrNameLst>
-                                      </p:cBhvr>
-                                      <p:to>
-                                        <p:strVal val="visible"/>
-                                      </p:to>
-                                    </p:set>
-                                    <p:animEffect transition="in" filter="fade">
-                                      <p:cBhvr>
-                                        <p:cTn id="22" dur="500"/>
-                                        <p:tgtEl>
-                                          <p:spTgt spid="3">
-                                            <p:txEl>
-                                              <p:pRg st="2" end="2"/>
-                                            </p:txEl>
-                                          </p:spTgt>
-                                        </p:tgtEl>
-                                      </p:cBhvr>
-                                    </p:animEffect>
-                                  </p:childTnLst>
-                                </p:cTn>
-                              </p:par>
-                            </p:childTnLst>
-                          </p:cTn>
-                        </p:par>
-                      </p:childTnLst>
-                    </p:cTn>
-                  </p:par>
-                  <p:par>
-                    <p:cTn id="23" fill="hold">
-                      <p:stCondLst>
-                        <p:cond delay="indefinite"/>
-                      </p:stCondLst>
-                      <p:childTnLst>
-                        <p:par>
-                          <p:cTn id="24" fill="hold">
-                            <p:stCondLst>
-                              <p:cond delay="0"/>
-                            </p:stCondLst>
-                            <p:childTnLst>
-                              <p:par>
-                                <p:cTn id="25" presetID="10" presetClass="entr" presetSubtype="0" fill="hold" grpId="0" nodeType="clickEffect">
-                                  <p:stCondLst>
-                                    <p:cond delay="0"/>
-                                  </p:stCondLst>
-                                  <p:childTnLst>
-                                    <p:set>
-                                      <p:cBhvr>
-                                        <p:cTn id="26" dur="1" fill="hold">
-                                          <p:stCondLst>
-                                            <p:cond delay="0"/>
-                                          </p:stCondLst>
-                                        </p:cTn>
-                                        <p:tgtEl>
-                                          <p:spTgt spid="3">
-                                            <p:txEl>
-                                              <p:pRg st="3" end="3"/>
-                                            </p:txEl>
-                                          </p:spTgt>
-                                        </p:tgtEl>
-                                        <p:attrNameLst>
-                                          <p:attrName>style.visibility</p:attrName>
-                                        </p:attrNameLst>
-                                      </p:cBhvr>
-                                      <p:to>
-                                        <p:strVal val="visible"/>
-                                      </p:to>
-                                    </p:set>
-                                    <p:animEffect transition="in" filter="fade">
-                                      <p:cBhvr>
-                                        <p:cTn id="27" dur="500"/>
-                                        <p:tgtEl>
-                                          <p:spTgt spid="3">
-                                            <p:txEl>
-                                              <p:pRg st="3" end="3"/>
-                                            </p:txEl>
-                                          </p:spTgt>
-                                        </p:tgtEl>
-                                      </p:cBhvr>
-                                    </p:animEffect>
-                                  </p:childTnLst>
-                                </p:cTn>
-                              </p:par>
-                            </p:childTnLst>
-                          </p:cTn>
-                        </p:par>
-                      </p:childTnLst>
-                    </p:cTn>
-                  </p:par>
-                  <p:par>
-                    <p:cTn id="28" fill="hold">
-                      <p:stCondLst>
-                        <p:cond delay="indefinite"/>
-                      </p:stCondLst>
-                      <p:childTnLst>
-                        <p:par>
-                          <p:cTn id="29" fill="hold">
-                            <p:stCondLst>
-                              <p:cond delay="0"/>
-                            </p:stCondLst>
-                            <p:childTnLst>
-                              <p:par>
-                                <p:cTn id="30" presetID="10" presetClass="entr" presetSubtype="0" fill="hold" grpId="0" nodeType="clickEffect">
-                                  <p:stCondLst>
-                                    <p:cond delay="0"/>
-                                  </p:stCondLst>
-                                  <p:childTnLst>
-                                    <p:set>
-                                      <p:cBhvr>
-                                        <p:cTn id="31" dur="1" fill="hold">
-                                          <p:stCondLst>
-                                            <p:cond delay="0"/>
-                                          </p:stCondLst>
-                                        </p:cTn>
-                                        <p:tgtEl>
-                                          <p:spTgt spid="3">
-                                            <p:txEl>
-                                              <p:pRg st="4" end="4"/>
-                                            </p:txEl>
-                                          </p:spTgt>
-                                        </p:tgtEl>
-                                        <p:attrNameLst>
-                                          <p:attrName>style.visibility</p:attrName>
-                                        </p:attrNameLst>
-                                      </p:cBhvr>
-                                      <p:to>
-                                        <p:strVal val="visible"/>
-                                      </p:to>
-                                    </p:set>
-                                    <p:animEffect transition="in" filter="fade">
-                                      <p:cBhvr>
-                                        <p:cTn id="32" dur="500"/>
-                                        <p:tgtEl>
-                                          <p:spTgt spid="3">
-                                            <p:txEl>
-                                              <p:pRg st="4" end="4"/>
-                                            </p:txEl>
-                                          </p:spTgt>
-                                        </p:tgtEl>
-                                      </p:cBhvr>
-                                    </p:animEffect>
-                                  </p:childTnLst>
-                                </p:cTn>
-                              </p:par>
-                            </p:childTnLst>
-                          </p:cTn>
-                        </p:par>
-                      </p:childTnLst>
-                    </p:cTn>
-                  </p:par>
-                  <p:par>
-                    <p:cTn id="33" fill="hold">
-                      <p:stCondLst>
-                        <p:cond delay="indefinite"/>
-                      </p:stCondLst>
-                      <p:childTnLst>
-                        <p:par>
-                          <p:cTn id="34" fill="hold">
-                            <p:stCondLst>
-                              <p:cond delay="0"/>
-                            </p:stCondLst>
-                            <p:childTnLst>
-                              <p:par>
-                                <p:cTn id="35" presetID="10" presetClass="entr" presetSubtype="0" fill="hold" grpId="0" nodeType="clickEffect">
-                                  <p:stCondLst>
-                                    <p:cond delay="0"/>
-                                  </p:stCondLst>
-                                  <p:childTnLst>
-                                    <p:set>
-                                      <p:cBhvr>
-                                        <p:cTn id="36" dur="1" fill="hold">
-                                          <p:stCondLst>
-                                            <p:cond delay="0"/>
-                                          </p:stCondLst>
-                                        </p:cTn>
-                                        <p:tgtEl>
-                                          <p:spTgt spid="3">
-                                            <p:txEl>
-                                              <p:pRg st="5" end="5"/>
-                                            </p:txEl>
-                                          </p:spTgt>
-                                        </p:tgtEl>
-                                        <p:attrNameLst>
-                                          <p:attrName>style.visibility</p:attrName>
-                                        </p:attrNameLst>
-                                      </p:cBhvr>
-                                      <p:to>
-                                        <p:strVal val="visible"/>
-                                      </p:to>
-                                    </p:set>
-                                    <p:animEffect transition="in" filter="fade">
-                                      <p:cBhvr>
-                                        <p:cTn id="37" dur="500"/>
-                                        <p:tgtEl>
-                                          <p:spTgt spid="3">
-                                            <p:txEl>
-                                              <p:pRg st="5" end="5"/>
-                                            </p:txEl>
-                                          </p:spTgt>
                                         </p:tgtEl>
                                       </p:cBhvr>
                                     </p:animEffect>
@@ -5209,6 +5515,617 @@
             <p:ph type="title"/>
           </p:nvPr>
         </p:nvSpPr>
+        <p:spPr>
+          <a:xfrm>
+            <a:off x="381000" y="274638"/>
+            <a:ext cx="8305800" cy="1249362"/>
+          </a:xfrm>
+        </p:spPr>
+        <p:txBody>
+          <a:bodyPr>
+            <a:normAutofit fontScale="90000"/>
+          </a:bodyPr>
+          <a:lstStyle/>
+          <a:p>
+            <a:r>
+              <a:rPr lang="en-US" dirty="0" smtClean="0"/>
+              <a:t>Our semester project:</a:t>
+            </a:r>
+            <a:br>
+              <a:rPr lang="en-US" dirty="0" smtClean="0"/>
+            </a:br>
+            <a:r>
+              <a:rPr lang="en-US" dirty="0" smtClean="0"/>
+              <a:t>Developing a framework library</a:t>
+            </a:r>
+            <a:endParaRPr lang="en-US" dirty="0"/>
+          </a:p>
+        </p:txBody>
+      </p:sp>
+      <p:sp>
+        <p:nvSpPr>
+          <p:cNvPr id="3" name="Content Placeholder 2"/>
+          <p:cNvSpPr>
+            <a:spLocks noGrp="1"/>
+          </p:cNvSpPr>
+          <p:nvPr>
+            <p:ph idx="1"/>
+          </p:nvPr>
+        </p:nvSpPr>
+        <p:spPr/>
+        <p:txBody>
+          <a:bodyPr/>
+          <a:lstStyle/>
+          <a:p>
+            <a:r>
+              <a:rPr lang="en-US" dirty="0" smtClean="0"/>
+              <a:t>This semester (fall 2017) we will be building a library that implements AOP design in order to make software easier and safer to develop.</a:t>
+            </a:r>
+          </a:p>
+          <a:p>
+            <a:r>
+              <a:rPr lang="en-US" dirty="0" smtClean="0"/>
+              <a:t>You have the opportunity to contribute to the details of how this model could and will work in actual software.</a:t>
+            </a:r>
+          </a:p>
+          <a:p>
+            <a:r>
+              <a:rPr lang="en-US" dirty="0" smtClean="0"/>
+              <a:t>Such details include:</a:t>
+            </a:r>
+          </a:p>
+          <a:p>
+            <a:pPr marL="137160" indent="0">
+              <a:buNone/>
+            </a:pPr>
+            <a:r>
+              <a:rPr lang="en-US" sz="1800" dirty="0" smtClean="0"/>
+              <a:t>- how an agent class </a:t>
+            </a:r>
+            <a:r>
+              <a:rPr lang="en-US" sz="1800" dirty="0" smtClean="0"/>
+              <a:t>interfaces with </a:t>
+            </a:r>
+            <a:r>
+              <a:rPr lang="en-US" sz="1800" dirty="0" smtClean="0"/>
+              <a:t>and learns from an environment class</a:t>
+            </a:r>
+          </a:p>
+          <a:p>
+            <a:pPr marL="137160" indent="0">
+              <a:buNone/>
+            </a:pPr>
+            <a:r>
+              <a:rPr lang="en-US" sz="1800" dirty="0" smtClean="0"/>
+              <a:t>- how agents </a:t>
+            </a:r>
+            <a:r>
+              <a:rPr lang="en-US" sz="1800" dirty="0" smtClean="0"/>
+              <a:t>can learn from </a:t>
+            </a:r>
+            <a:r>
+              <a:rPr lang="en-US" sz="1800" dirty="0" smtClean="0"/>
+              <a:t>each other to complete tasks at runtime</a:t>
+            </a:r>
+          </a:p>
+          <a:p>
+            <a:pPr marL="137160" indent="0">
+              <a:buNone/>
+            </a:pPr>
+            <a:r>
+              <a:rPr lang="en-US" sz="1800" dirty="0" smtClean="0"/>
+              <a:t>- how agents </a:t>
+            </a:r>
+            <a:r>
+              <a:rPr lang="en-US" sz="1800" dirty="0" smtClean="0"/>
+              <a:t>can be trained to handle new errors </a:t>
+            </a:r>
+            <a:r>
+              <a:rPr lang="en-US" sz="1800" dirty="0" smtClean="0"/>
+              <a:t>gracefully and intelligently</a:t>
+            </a:r>
+          </a:p>
+          <a:p>
+            <a:pPr marL="137160" indent="0">
+              <a:buNone/>
+            </a:pPr>
+            <a:endParaRPr lang="en-US" dirty="0"/>
+          </a:p>
+        </p:txBody>
+      </p:sp>
+    </p:spTree>
+    <p:extLst>
+      <p:ext uri="{BB962C8B-B14F-4D97-AF65-F5344CB8AC3E}">
+        <p14:creationId xmlns:p14="http://schemas.microsoft.com/office/powerpoint/2010/main" val="3316632516"/>
+      </p:ext>
+    </p:extLst>
+  </p:cSld>
+  <p:clrMapOvr>
+    <a:masterClrMapping/>
+  </p:clrMapOvr>
+  <p:timing>
+    <p:tnLst>
+      <p:par>
+        <p:cTn id="1" dur="indefinite" restart="never" nodeType="tmRoot">
+          <p:childTnLst>
+            <p:seq concurrent="1" nextAc="seek">
+              <p:cTn id="2" dur="indefinite" nodeType="mainSeq">
+                <p:childTnLst>
+                  <p:par>
+                    <p:cTn id="3" fill="hold">
+                      <p:stCondLst>
+                        <p:cond delay="indefinite"/>
+                      </p:stCondLst>
+                      <p:childTnLst>
+                        <p:par>
+                          <p:cTn id="4" fill="hold">
+                            <p:stCondLst>
+                              <p:cond delay="0"/>
+                            </p:stCondLst>
+                            <p:childTnLst>
+                              <p:par>
+                                <p:cTn id="5" presetID="10" presetClass="entr" presetSubtype="0" fill="hold" grpId="0" nodeType="clickEffect">
+                                  <p:stCondLst>
+                                    <p:cond delay="0"/>
+                                  </p:stCondLst>
+                                  <p:childTnLst>
+                                    <p:set>
+                                      <p:cBhvr>
+                                        <p:cTn id="6" dur="1" fill="hold">
+                                          <p:stCondLst>
+                                            <p:cond delay="0"/>
+                                          </p:stCondLst>
+                                        </p:cTn>
+                                        <p:tgtEl>
+                                          <p:spTgt spid="2"/>
+                                        </p:tgtEl>
+                                        <p:attrNameLst>
+                                          <p:attrName>style.visibility</p:attrName>
+                                        </p:attrNameLst>
+                                      </p:cBhvr>
+                                      <p:to>
+                                        <p:strVal val="visible"/>
+                                      </p:to>
+                                    </p:set>
+                                    <p:animEffect transition="in" filter="fade">
+                                      <p:cBhvr>
+                                        <p:cTn id="7" dur="500"/>
+                                        <p:tgtEl>
+                                          <p:spTgt spid="2"/>
+                                        </p:tgtEl>
+                                      </p:cBhvr>
+                                    </p:animEffect>
+                                  </p:childTnLst>
+                                </p:cTn>
+                              </p:par>
+                            </p:childTnLst>
+                          </p:cTn>
+                        </p:par>
+                      </p:childTnLst>
+                    </p:cTn>
+                  </p:par>
+                  <p:par>
+                    <p:cTn id="8" fill="hold">
+                      <p:stCondLst>
+                        <p:cond delay="indefinite"/>
+                      </p:stCondLst>
+                      <p:childTnLst>
+                        <p:par>
+                          <p:cTn id="9" fill="hold">
+                            <p:stCondLst>
+                              <p:cond delay="0"/>
+                            </p:stCondLst>
+                            <p:childTnLst>
+                              <p:par>
+                                <p:cTn id="10" presetID="10" presetClass="entr" presetSubtype="0" fill="hold" grpId="0" nodeType="clickEffect">
+                                  <p:stCondLst>
+                                    <p:cond delay="0"/>
+                                  </p:stCondLst>
+                                  <p:childTnLst>
+                                    <p:set>
+                                      <p:cBhvr>
+                                        <p:cTn id="11" dur="1" fill="hold">
+                                          <p:stCondLst>
+                                            <p:cond delay="0"/>
+                                          </p:stCondLst>
+                                        </p:cTn>
+                                        <p:tgtEl>
+                                          <p:spTgt spid="3">
+                                            <p:txEl>
+                                              <p:pRg st="0" end="0"/>
+                                            </p:txEl>
+                                          </p:spTgt>
+                                        </p:tgtEl>
+                                        <p:attrNameLst>
+                                          <p:attrName>style.visibility</p:attrName>
+                                        </p:attrNameLst>
+                                      </p:cBhvr>
+                                      <p:to>
+                                        <p:strVal val="visible"/>
+                                      </p:to>
+                                    </p:set>
+                                    <p:animEffect transition="in" filter="fade">
+                                      <p:cBhvr>
+                                        <p:cTn id="12" dur="500"/>
+                                        <p:tgtEl>
+                                          <p:spTgt spid="3">
+                                            <p:txEl>
+                                              <p:pRg st="0" end="0"/>
+                                            </p:txEl>
+                                          </p:spTgt>
+                                        </p:tgtEl>
+                                      </p:cBhvr>
+                                    </p:animEffect>
+                                  </p:childTnLst>
+                                </p:cTn>
+                              </p:par>
+                            </p:childTnLst>
+                          </p:cTn>
+                        </p:par>
+                      </p:childTnLst>
+                    </p:cTn>
+                  </p:par>
+                  <p:par>
+                    <p:cTn id="13" fill="hold">
+                      <p:stCondLst>
+                        <p:cond delay="indefinite"/>
+                      </p:stCondLst>
+                      <p:childTnLst>
+                        <p:par>
+                          <p:cTn id="14" fill="hold">
+                            <p:stCondLst>
+                              <p:cond delay="0"/>
+                            </p:stCondLst>
+                            <p:childTnLst>
+                              <p:par>
+                                <p:cTn id="15" presetID="10" presetClass="entr" presetSubtype="0" fill="hold" grpId="0" nodeType="clickEffect">
+                                  <p:stCondLst>
+                                    <p:cond delay="0"/>
+                                  </p:stCondLst>
+                                  <p:childTnLst>
+                                    <p:set>
+                                      <p:cBhvr>
+                                        <p:cTn id="16" dur="1" fill="hold">
+                                          <p:stCondLst>
+                                            <p:cond delay="0"/>
+                                          </p:stCondLst>
+                                        </p:cTn>
+                                        <p:tgtEl>
+                                          <p:spTgt spid="3">
+                                            <p:txEl>
+                                              <p:pRg st="1" end="1"/>
+                                            </p:txEl>
+                                          </p:spTgt>
+                                        </p:tgtEl>
+                                        <p:attrNameLst>
+                                          <p:attrName>style.visibility</p:attrName>
+                                        </p:attrNameLst>
+                                      </p:cBhvr>
+                                      <p:to>
+                                        <p:strVal val="visible"/>
+                                      </p:to>
+                                    </p:set>
+                                    <p:animEffect transition="in" filter="fade">
+                                      <p:cBhvr>
+                                        <p:cTn id="17" dur="500"/>
+                                        <p:tgtEl>
+                                          <p:spTgt spid="3">
+                                            <p:txEl>
+                                              <p:pRg st="1" end="1"/>
+                                            </p:txEl>
+                                          </p:spTgt>
+                                        </p:tgtEl>
+                                      </p:cBhvr>
+                                    </p:animEffect>
+                                  </p:childTnLst>
+                                </p:cTn>
+                              </p:par>
+                            </p:childTnLst>
+                          </p:cTn>
+                        </p:par>
+                      </p:childTnLst>
+                    </p:cTn>
+                  </p:par>
+                  <p:par>
+                    <p:cTn id="18" fill="hold">
+                      <p:stCondLst>
+                        <p:cond delay="indefinite"/>
+                      </p:stCondLst>
+                      <p:childTnLst>
+                        <p:par>
+                          <p:cTn id="19" fill="hold">
+                            <p:stCondLst>
+                              <p:cond delay="0"/>
+                            </p:stCondLst>
+                            <p:childTnLst>
+                              <p:par>
+                                <p:cTn id="20" presetID="10" presetClass="entr" presetSubtype="0" fill="hold" grpId="0" nodeType="clickEffect">
+                                  <p:stCondLst>
+                                    <p:cond delay="0"/>
+                                  </p:stCondLst>
+                                  <p:childTnLst>
+                                    <p:set>
+                                      <p:cBhvr>
+                                        <p:cTn id="21" dur="1" fill="hold">
+                                          <p:stCondLst>
+                                            <p:cond delay="0"/>
+                                          </p:stCondLst>
+                                        </p:cTn>
+                                        <p:tgtEl>
+                                          <p:spTgt spid="3">
+                                            <p:txEl>
+                                              <p:pRg st="2" end="2"/>
+                                            </p:txEl>
+                                          </p:spTgt>
+                                        </p:tgtEl>
+                                        <p:attrNameLst>
+                                          <p:attrName>style.visibility</p:attrName>
+                                        </p:attrNameLst>
+                                      </p:cBhvr>
+                                      <p:to>
+                                        <p:strVal val="visible"/>
+                                      </p:to>
+                                    </p:set>
+                                    <p:animEffect transition="in" filter="fade">
+                                      <p:cBhvr>
+                                        <p:cTn id="22" dur="500"/>
+                                        <p:tgtEl>
+                                          <p:spTgt spid="3">
+                                            <p:txEl>
+                                              <p:pRg st="2" end="2"/>
+                                            </p:txEl>
+                                          </p:spTgt>
+                                        </p:tgtEl>
+                                      </p:cBhvr>
+                                    </p:animEffect>
+                                  </p:childTnLst>
+                                </p:cTn>
+                              </p:par>
+                            </p:childTnLst>
+                          </p:cTn>
+                        </p:par>
+                      </p:childTnLst>
+                    </p:cTn>
+                  </p:par>
+                  <p:par>
+                    <p:cTn id="23" fill="hold">
+                      <p:stCondLst>
+                        <p:cond delay="indefinite"/>
+                      </p:stCondLst>
+                      <p:childTnLst>
+                        <p:par>
+                          <p:cTn id="24" fill="hold">
+                            <p:stCondLst>
+                              <p:cond delay="0"/>
+                            </p:stCondLst>
+                            <p:childTnLst>
+                              <p:par>
+                                <p:cTn id="25" presetID="10" presetClass="entr" presetSubtype="0" fill="hold" grpId="0" nodeType="clickEffect">
+                                  <p:stCondLst>
+                                    <p:cond delay="0"/>
+                                  </p:stCondLst>
+                                  <p:childTnLst>
+                                    <p:set>
+                                      <p:cBhvr>
+                                        <p:cTn id="26" dur="1" fill="hold">
+                                          <p:stCondLst>
+                                            <p:cond delay="0"/>
+                                          </p:stCondLst>
+                                        </p:cTn>
+                                        <p:tgtEl>
+                                          <p:spTgt spid="3">
+                                            <p:txEl>
+                                              <p:pRg st="3" end="3"/>
+                                            </p:txEl>
+                                          </p:spTgt>
+                                        </p:tgtEl>
+                                        <p:attrNameLst>
+                                          <p:attrName>style.visibility</p:attrName>
+                                        </p:attrNameLst>
+                                      </p:cBhvr>
+                                      <p:to>
+                                        <p:strVal val="visible"/>
+                                      </p:to>
+                                    </p:set>
+                                    <p:animEffect transition="in" filter="fade">
+                                      <p:cBhvr>
+                                        <p:cTn id="27" dur="500"/>
+                                        <p:tgtEl>
+                                          <p:spTgt spid="3">
+                                            <p:txEl>
+                                              <p:pRg st="3" end="3"/>
+                                            </p:txEl>
+                                          </p:spTgt>
+                                        </p:tgtEl>
+                                      </p:cBhvr>
+                                    </p:animEffect>
+                                  </p:childTnLst>
+                                </p:cTn>
+                              </p:par>
+                            </p:childTnLst>
+                          </p:cTn>
+                        </p:par>
+                      </p:childTnLst>
+                    </p:cTn>
+                  </p:par>
+                  <p:par>
+                    <p:cTn id="28" fill="hold">
+                      <p:stCondLst>
+                        <p:cond delay="indefinite"/>
+                      </p:stCondLst>
+                      <p:childTnLst>
+                        <p:par>
+                          <p:cTn id="29" fill="hold">
+                            <p:stCondLst>
+                              <p:cond delay="0"/>
+                            </p:stCondLst>
+                            <p:childTnLst>
+                              <p:par>
+                                <p:cTn id="30" presetID="10" presetClass="entr" presetSubtype="0" fill="hold" grpId="0" nodeType="clickEffect">
+                                  <p:stCondLst>
+                                    <p:cond delay="0"/>
+                                  </p:stCondLst>
+                                  <p:childTnLst>
+                                    <p:set>
+                                      <p:cBhvr>
+                                        <p:cTn id="31" dur="1" fill="hold">
+                                          <p:stCondLst>
+                                            <p:cond delay="0"/>
+                                          </p:stCondLst>
+                                        </p:cTn>
+                                        <p:tgtEl>
+                                          <p:spTgt spid="3">
+                                            <p:txEl>
+                                              <p:pRg st="4" end="4"/>
+                                            </p:txEl>
+                                          </p:spTgt>
+                                        </p:tgtEl>
+                                        <p:attrNameLst>
+                                          <p:attrName>style.visibility</p:attrName>
+                                        </p:attrNameLst>
+                                      </p:cBhvr>
+                                      <p:to>
+                                        <p:strVal val="visible"/>
+                                      </p:to>
+                                    </p:set>
+                                    <p:animEffect transition="in" filter="fade">
+                                      <p:cBhvr>
+                                        <p:cTn id="32" dur="500"/>
+                                        <p:tgtEl>
+                                          <p:spTgt spid="3">
+                                            <p:txEl>
+                                              <p:pRg st="4" end="4"/>
+                                            </p:txEl>
+                                          </p:spTgt>
+                                        </p:tgtEl>
+                                      </p:cBhvr>
+                                    </p:animEffect>
+                                  </p:childTnLst>
+                                </p:cTn>
+                              </p:par>
+                            </p:childTnLst>
+                          </p:cTn>
+                        </p:par>
+                      </p:childTnLst>
+                    </p:cTn>
+                  </p:par>
+                  <p:par>
+                    <p:cTn id="33" fill="hold">
+                      <p:stCondLst>
+                        <p:cond delay="indefinite"/>
+                      </p:stCondLst>
+                      <p:childTnLst>
+                        <p:par>
+                          <p:cTn id="34" fill="hold">
+                            <p:stCondLst>
+                              <p:cond delay="0"/>
+                            </p:stCondLst>
+                            <p:childTnLst>
+                              <p:par>
+                                <p:cTn id="35" presetID="10" presetClass="entr" presetSubtype="0" fill="hold" grpId="0" nodeType="clickEffect">
+                                  <p:stCondLst>
+                                    <p:cond delay="0"/>
+                                  </p:stCondLst>
+                                  <p:childTnLst>
+                                    <p:set>
+                                      <p:cBhvr>
+                                        <p:cTn id="36" dur="1" fill="hold">
+                                          <p:stCondLst>
+                                            <p:cond delay="0"/>
+                                          </p:stCondLst>
+                                        </p:cTn>
+                                        <p:tgtEl>
+                                          <p:spTgt spid="3">
+                                            <p:txEl>
+                                              <p:pRg st="5" end="5"/>
+                                            </p:txEl>
+                                          </p:spTgt>
+                                        </p:tgtEl>
+                                        <p:attrNameLst>
+                                          <p:attrName>style.visibility</p:attrName>
+                                        </p:attrNameLst>
+                                      </p:cBhvr>
+                                      <p:to>
+                                        <p:strVal val="visible"/>
+                                      </p:to>
+                                    </p:set>
+                                    <p:animEffect transition="in" filter="fade">
+                                      <p:cBhvr>
+                                        <p:cTn id="37" dur="500"/>
+                                        <p:tgtEl>
+                                          <p:spTgt spid="3">
+                                            <p:txEl>
+                                              <p:pRg st="5" end="5"/>
+                                            </p:txEl>
+                                          </p:spTgt>
+                                        </p:tgtEl>
+                                      </p:cBhvr>
+                                    </p:animEffect>
+                                  </p:childTnLst>
+                                </p:cTn>
+                              </p:par>
+                            </p:childTnLst>
+                          </p:cTn>
+                        </p:par>
+                      </p:childTnLst>
+                    </p:cTn>
+                  </p:par>
+                </p:childTnLst>
+              </p:cTn>
+              <p:prevCondLst>
+                <p:cond evt="onPrev" delay="0">
+                  <p:tgtEl>
+                    <p:sldTgt/>
+                  </p:tgtEl>
+                </p:cond>
+              </p:prevCondLst>
+              <p:nextCondLst>
+                <p:cond evt="onNext" delay="0">
+                  <p:tgtEl>
+                    <p:sldTgt/>
+                  </p:tgtEl>
+                </p:cond>
+              </p:nextCondLst>
+            </p:seq>
+          </p:childTnLst>
+        </p:cTn>
+      </p:par>
+    </p:tnLst>
+    <p:bldLst>
+      <p:bldP spid="2" grpId="0"/>
+      <p:bldP spid="3" grpId="0" build="p"/>
+    </p:bldLst>
+  </p:timing>
+</p:sld>
+</file>
+
+<file path=ppt/slides/slide14.xml><?xml version="1.0" encoding="utf-8"?>
+<p:sld xmlns:a="http://schemas.openxmlformats.org/drawingml/2006/main" xmlns:r="http://schemas.openxmlformats.org/officeDocument/2006/relationships" xmlns:p="http://schemas.openxmlformats.org/presentationml/2006/main">
+  <p:cSld>
+    <p:spTree>
+      <p:nvGrpSpPr>
+        <p:cNvPr id="1" name=""/>
+        <p:cNvGrpSpPr/>
+        <p:nvPr/>
+      </p:nvGrpSpPr>
+      <p:grpSpPr>
+        <a:xfrm>
+          <a:off x="0" y="0"/>
+          <a:ext cx="0" cy="0"/>
+          <a:chOff x="0" y="0"/>
+          <a:chExt cx="0" cy="0"/>
+        </a:xfrm>
+      </p:grpSpPr>
+      <p:sp>
+        <p:nvSpPr>
+          <p:cNvPr id="2" name="Title 1"/>
+          <p:cNvSpPr>
+            <a:spLocks noGrp="1"/>
+          </p:cNvSpPr>
+          <p:nvPr>
+            <p:ph type="title"/>
+          </p:nvPr>
+        </p:nvSpPr>
         <p:spPr/>
         <p:txBody>
           <a:bodyPr/>
@@ -5286,7 +6203,7 @@
 </p:sld>
 </file>
 
-<file path=ppt/slides/slide14.xml><?xml version="1.0" encoding="utf-8"?>
+<file path=ppt/slides/slide15.xml><?xml version="1.0" encoding="utf-8"?>
 <p:sld xmlns:a="http://schemas.openxmlformats.org/drawingml/2006/main" xmlns:r="http://schemas.openxmlformats.org/officeDocument/2006/relationships" xmlns:p="http://schemas.openxmlformats.org/presentationml/2006/main">
   <p:cSld>
     <p:spTree>
@@ -5342,14 +6259,14 @@
           <p:nvPr>
             <p:extLst>
               <p:ext uri="{D42A27DB-BD31-4B8C-83A1-F6EECF244321}">
-                <p14:modId xmlns:p14="http://schemas.microsoft.com/office/powerpoint/2010/main" val="1462193037"/>
+                <p14:modId xmlns:p14="http://schemas.microsoft.com/office/powerpoint/2010/main" val="3923873881"/>
               </p:ext>
             </p:extLst>
           </p:nvPr>
         </p:nvGraphicFramePr>
         <p:xfrm>
-          <a:off x="152400" y="1209502"/>
-          <a:ext cx="8839200" cy="5669280"/>
+          <a:off x="0" y="1143000"/>
+          <a:ext cx="9144000" cy="6100117"/>
         </p:xfrm>
         <a:graphic>
           <a:graphicData uri="http://schemas.openxmlformats.org/drawingml/2006/table">
@@ -5358,10 +6275,10 @@
                 <a:tableStyleId>{5C22544A-7EE6-4342-B048-85BDC9FD1C3A}</a:tableStyleId>
               </a:tblPr>
               <a:tblGrid>
-                <a:gridCol w="4419600"/>
-                <a:gridCol w="4419600"/>
+                <a:gridCol w="4572000"/>
+                <a:gridCol w="4572000"/>
               </a:tblGrid>
-              <a:tr h="672110">
+              <a:tr h="586247">
                 <a:tc>
                   <a:txBody>
                     <a:bodyPr/>
@@ -5369,14 +6286,10 @@
                     <a:p>
                       <a:pPr algn="ctr"/>
                       <a:r>
-                        <a:rPr lang="en-US" dirty="0" smtClean="0"/>
-                        <a:t> </a:t>
+                        <a:rPr lang="en-US" sz="3600" dirty="0" smtClean="0"/>
+                        <a:t> OOP</a:t>
                       </a:r>
-                      <a:r>
-                        <a:rPr lang="en-US" sz="6600" dirty="0" smtClean="0"/>
-                        <a:t>OOP</a:t>
-                      </a:r>
-                      <a:endParaRPr lang="en-US" sz="6600" dirty="0"/>
+                      <a:endParaRPr lang="en-US" sz="3600" dirty="0"/>
                     </a:p>
                   </a:txBody>
                   <a:tcPr>
@@ -5394,10 +6307,10 @@
                     <a:p>
                       <a:pPr algn="ctr"/>
                       <a:r>
-                        <a:rPr lang="en-US" sz="6600" dirty="0" smtClean="0"/>
+                        <a:rPr lang="en-US" sz="3600" dirty="0" smtClean="0"/>
                         <a:t>AOP</a:t>
                       </a:r>
-                      <a:endParaRPr lang="en-US" sz="6600" dirty="0"/>
+                      <a:endParaRPr lang="en-US" sz="3600" dirty="0"/>
                     </a:p>
                   </a:txBody>
                   <a:tcPr>
@@ -5409,7 +6322,7 @@
                   </a:tcPr>
                 </a:tc>
               </a:tr>
-              <a:tr h="1083594">
+              <a:tr h="1088745">
                 <a:tc>
                   <a:txBody>
                     <a:bodyPr/>
@@ -5459,7 +6372,7 @@
                   <a:tcPr/>
                 </a:tc>
               </a:tr>
-              <a:tr h="833534">
+              <a:tr h="837496">
                 <a:tc>
                   <a:txBody>
                     <a:bodyPr/>
@@ -5479,15 +6392,7 @@
                       </a:r>
                       <a:r>
                         <a:rPr lang="en-US" baseline="0" dirty="0" smtClean="0"/>
-                        <a:t> generally dynamic, and have </a:t>
-                      </a:r>
-                      <a:r>
-                        <a:rPr lang="en-US" baseline="0" dirty="0" smtClean="0"/>
-                        <a:t>multiple instances </a:t>
-                      </a:r>
-                      <a:r>
-                        <a:rPr lang="en-US" baseline="0" dirty="0" smtClean="0"/>
-                        <a:t>created.</a:t>
+                        <a:t> generally dynamic, and have multiple instances created.</a:t>
                       </a:r>
                       <a:endParaRPr lang="en-US" dirty="0"/>
                     </a:p>
@@ -5501,19 +6406,19 @@
                     <a:p>
                       <a:r>
                         <a:rPr lang="en-US" dirty="0" smtClean="0"/>
-                        <a:t>Agent classes are generally static,</a:t>
+                        <a:t>Agent classes are </a:t>
+                      </a:r>
+                      <a:r>
+                        <a:rPr lang="en-US" b="1" i="0" u="sng" dirty="0" smtClean="0"/>
+                        <a:t>always </a:t>
+                      </a:r>
+                      <a:r>
+                        <a:rPr lang="en-US" dirty="0" smtClean="0"/>
+                        <a:t>static,</a:t>
                       </a:r>
                       <a:r>
                         <a:rPr lang="en-US" baseline="0" dirty="0" smtClean="0"/>
-                        <a:t> and only one </a:t>
-                      </a:r>
-                      <a:r>
-                        <a:rPr lang="en-US" baseline="0" dirty="0" smtClean="0"/>
-                        <a:t>instance of each agent </a:t>
-                      </a:r>
-                      <a:r>
-                        <a:rPr lang="en-US" baseline="0" dirty="0" smtClean="0"/>
-                        <a:t>is created for the entire program.</a:t>
+                        <a:t> and only one instance of each agent is created for the entire program.</a:t>
                       </a:r>
                       <a:endParaRPr lang="en-US" dirty="0"/>
                     </a:p>
@@ -5521,7 +6426,7 @@
                   <a:tcPr/>
                 </a:tc>
               </a:tr>
-              <a:tr h="833534">
+              <a:tr h="1065076">
                 <a:tc>
                   <a:txBody>
                     <a:bodyPr/>
@@ -5537,15 +6442,7 @@
                       </a:r>
                       <a:r>
                         <a:rPr lang="en-US" dirty="0" smtClean="0"/>
-                        <a:t> </a:t>
-                      </a:r>
-                      <a:r>
-                        <a:rPr lang="en-US" dirty="0" smtClean="0"/>
-                        <a:t>and </a:t>
-                      </a:r>
-                      <a:r>
-                        <a:rPr lang="en-US" dirty="0" smtClean="0"/>
-                        <a:t>methods through inheritance to </a:t>
+                        <a:t> and methods through inheritance to </a:t>
                       </a:r>
                       <a:r>
                         <a:rPr lang="en-US" baseline="0" dirty="0" smtClean="0"/>
@@ -5562,12 +6459,24 @@
                     <a:lstStyle/>
                     <a:p>
                       <a:r>
-                        <a:rPr lang="en-US" dirty="0" smtClean="0"/>
-                        <a:t>All agents</a:t>
+                        <a:rPr lang="en-US" baseline="0" dirty="0" smtClean="0"/>
+                        <a:t>Avoids redundant code </a:t>
                       </a:r>
                       <a:r>
                         <a:rPr lang="en-US" baseline="0" dirty="0" smtClean="0"/>
-                        <a:t> are subclasses of the Agent class. Avoids redundant code by dividing similar tasks to the appropriate Agent.</a:t>
+                        <a:t>by dividing similar tasks to the appropriate Agent</a:t>
+                      </a:r>
+                      <a:r>
+                        <a:rPr lang="en-US" baseline="0" dirty="0" smtClean="0"/>
+                        <a:t>. Agents only inherit from the parent agent class, </a:t>
+                      </a:r>
+                      <a:r>
+                        <a:rPr lang="en-US" b="1" u="sng" baseline="0" dirty="0" smtClean="0"/>
+                        <a:t>not other agents</a:t>
+                      </a:r>
+                      <a:r>
+                        <a:rPr lang="en-US" baseline="0" dirty="0" smtClean="0"/>
+                        <a:t>.</a:t>
                       </a:r>
                       <a:endParaRPr lang="en-US" dirty="0"/>
                     </a:p>
@@ -5575,7 +6484,7 @@
                   <a:tcPr/>
                 </a:tc>
               </a:tr>
-              <a:tr h="1083594">
+              <a:tr h="1802437">
                 <a:tc>
                   <a:txBody>
                     <a:bodyPr/>
@@ -5587,11 +6496,7 @@
                       </a:r>
                       <a:r>
                         <a:rPr lang="en-US" baseline="0" dirty="0" smtClean="0"/>
-                        <a:t> for public and private variables and methods</a:t>
-                      </a:r>
-                      <a:r>
-                        <a:rPr lang="en-US" baseline="0" dirty="0" smtClean="0"/>
-                        <a:t>.</a:t>
+                        <a:t> for public and private variables and methods.</a:t>
                       </a:r>
                     </a:p>
                     <a:p>
@@ -5615,25 +6520,29 @@
                       </a:r>
                       <a:r>
                         <a:rPr lang="en-US" baseline="0" dirty="0" smtClean="0"/>
-                        <a:t> an agent are private and cannot be directly changed by other agents</a:t>
+                        <a:t> an agent are </a:t>
+                      </a:r>
+                      <a:r>
+                        <a:rPr lang="en-US" b="1" u="sng" baseline="0" dirty="0" smtClean="0"/>
+                        <a:t>private</a:t>
                       </a:r>
                       <a:r>
                         <a:rPr lang="en-US" baseline="0" dirty="0" smtClean="0"/>
-                        <a:t>. Agents “ask” each other for data.</a:t>
+                        <a:t> and cannot be directly changed by other agents. Agents “ask” each other for data.</a:t>
                       </a:r>
                     </a:p>
                     <a:p>
                       <a:r>
-                        <a:rPr lang="en-US" baseline="0" dirty="0" smtClean="0"/>
-                        <a:t>No getters or setters! No global variables!</a:t>
+                        <a:rPr lang="en-US" b="1" u="none" baseline="0" dirty="0" smtClean="0"/>
+                        <a:t>Gives programmers the ease of global variables without the dangers.</a:t>
                       </a:r>
-                      <a:endParaRPr lang="en-US" baseline="0" dirty="0" smtClean="0"/>
+                      <a:endParaRPr lang="en-US" b="1" u="none" baseline="0" dirty="0" smtClean="0"/>
                     </a:p>
                   </a:txBody>
                   <a:tcPr/>
                 </a:tc>
               </a:tr>
-              <a:tr h="333414">
+              <a:tr h="334998">
                 <a:tc>
                   <a:txBody>
                     <a:bodyPr/>
@@ -5811,7 +6720,7 @@
 </p:sld>
 </file>
 
-<file path=ppt/slides/slide15.xml><?xml version="1.0" encoding="utf-8"?>
+<file path=ppt/slides/slide16.xml><?xml version="1.0" encoding="utf-8"?>
 <p:sld xmlns:a="http://schemas.openxmlformats.org/drawingml/2006/main" xmlns:r="http://schemas.openxmlformats.org/officeDocument/2006/relationships" xmlns:p="http://schemas.openxmlformats.org/presentationml/2006/main">
   <p:cSld>
     <p:spTree>
@@ -6847,33 +7756,15 @@
                                   </p:childTnLst>
                                 </p:cTn>
                               </p:par>
-                            </p:childTnLst>
-                          </p:cTn>
-                        </p:par>
-                      </p:childTnLst>
-                    </p:cTn>
-                  </p:par>
-                  <p:par>
-                    <p:cTn id="28" fill="hold">
-                      <p:stCondLst>
-                        <p:cond delay="indefinite"/>
-                      </p:stCondLst>
-                      <p:childTnLst>
-                        <p:par>
-                          <p:cTn id="29" fill="hold">
-                            <p:stCondLst>
-                              <p:cond delay="0"/>
-                            </p:stCondLst>
-                            <p:childTnLst>
                               <p:par>
-                                <p:cTn id="30" presetID="10" presetClass="entr" presetSubtype="0" fill="hold" grpId="0" nodeType="clickEffect">
+                                <p:cTn id="28" presetID="10" presetClass="entr" presetSubtype="0" fill="hold" grpId="0" nodeType="withEffect">
                                   <p:stCondLst>
                                     <p:cond delay="0"/>
                                   </p:stCondLst>
                                   <p:childTnLst>
                                     <p:set>
                                       <p:cBhvr>
-                                        <p:cTn id="31" dur="1" fill="hold">
+                                        <p:cTn id="29" dur="1" fill="hold">
                                           <p:stCondLst>
                                             <p:cond delay="0"/>
                                           </p:stCondLst>
@@ -6891,7 +7782,7 @@
                                     </p:set>
                                     <p:animEffect transition="in" filter="fade">
                                       <p:cBhvr>
-                                        <p:cTn id="32" dur="500"/>
+                                        <p:cTn id="30" dur="500"/>
                                         <p:tgtEl>
                                           <p:spTgt spid="4"/>
                                         </p:tgtEl>
@@ -6987,46 +7878,127 @@
             <p:ph idx="1"/>
           </p:nvPr>
         </p:nvSpPr>
-        <p:spPr/>
+        <p:spPr>
+          <a:xfrm>
+            <a:off x="0" y="1143000"/>
+            <a:ext cx="8229600" cy="4709160"/>
+          </a:xfrm>
+        </p:spPr>
         <p:txBody>
           <a:bodyPr/>
           <a:lstStyle/>
           <a:p>
             <a:r>
               <a:rPr lang="en-US" dirty="0" smtClean="0"/>
-              <a:t>An agent can be defined as a module(or class) that contains all </a:t>
+              <a:t>An agent can be defined as a module(or class) that contains all the necessary data and methods to perform a unique set of tasks </a:t>
             </a:r>
             <a:r>
               <a:rPr lang="en-US" dirty="0" smtClean="0"/>
-              <a:t>the necessary </a:t>
-            </a:r>
+              <a:t>individually, like a human.</a:t>
+            </a:r>
+          </a:p>
+          <a:p>
             <a:r>
               <a:rPr lang="en-US" dirty="0" smtClean="0"/>
-              <a:t>data and methods to perform a unique set of tasks individually.</a:t>
-            </a:r>
-          </a:p>
+              <a:t>An example of this concept is the character Data from Star Trek TNG. An android that acts human, but can perform functions               much more quickly and efficiently.</a:t>
+            </a:r>
+          </a:p>
+        </p:txBody>
+      </p:sp>
+      <p:pic>
+        <p:nvPicPr>
+          <p:cNvPr id="1026" name="Picture 2"/>
+          <p:cNvPicPr>
+            <a:picLocks noChangeAspect="1" noChangeArrowheads="1"/>
+          </p:cNvPicPr>
+          <p:nvPr/>
+        </p:nvPicPr>
+        <p:blipFill>
+          <a:blip r:embed="rId2">
+            <a:extLst>
+              <a:ext uri="{28A0092B-C50C-407E-A947-70E740481C1C}">
+                <a14:useLocalDpi xmlns:a14="http://schemas.microsoft.com/office/drawing/2010/main" val="0"/>
+              </a:ext>
+            </a:extLst>
+          </a:blip>
+          <a:srcRect/>
+          <a:stretch>
+            <a:fillRect/>
+          </a:stretch>
+        </p:blipFill>
+        <p:spPr bwMode="auto">
+          <a:xfrm>
+            <a:off x="6324600" y="3886200"/>
+            <a:ext cx="2362200" cy="2878250"/>
+          </a:xfrm>
+          <a:prstGeom prst="rect">
+            <a:avLst/>
+          </a:prstGeom>
+          <a:noFill/>
+          <a:ln>
+            <a:noFill/>
+          </a:ln>
+          <a:effectLst/>
+          <a:extLst>
+            <a:ext uri="{909E8E84-426E-40DD-AFC4-6F175D3DCCD1}">
+              <a14:hiddenFill xmlns:a14="http://schemas.microsoft.com/office/drawing/2010/main">
+                <a:solidFill>
+                  <a:schemeClr val="accent1"/>
+                </a:solidFill>
+              </a14:hiddenFill>
+            </a:ext>
+            <a:ext uri="{91240B29-F687-4F45-9708-019B960494DF}">
+              <a14:hiddenLine xmlns:a14="http://schemas.microsoft.com/office/drawing/2010/main" w="9525">
+                <a:solidFill>
+                  <a:schemeClr val="tx1"/>
+                </a:solidFill>
+                <a:miter lim="800000"/>
+                <a:headEnd/>
+                <a:tailEnd/>
+              </a14:hiddenLine>
+            </a:ext>
+            <a:ext uri="{AF507438-7753-43E0-B8FC-AC1667EBCBE1}">
+              <a14:hiddenEffects xmlns:a14="http://schemas.microsoft.com/office/drawing/2010/main">
+                <a:effectLst>
+                  <a:outerShdw dist="35921" dir="2700000" algn="ctr" rotWithShape="0">
+                    <a:schemeClr val="bg2"/>
+                  </a:outerShdw>
+                </a:effectLst>
+              </a14:hiddenEffects>
+            </a:ext>
+          </a:extLst>
+        </p:spPr>
+      </p:pic>
+      <p:sp>
+        <p:nvSpPr>
+          <p:cNvPr id="4" name="TextBox 3"/>
+          <p:cNvSpPr txBox="1"/>
+          <p:nvPr/>
+        </p:nvSpPr>
+        <p:spPr>
+          <a:xfrm>
+            <a:off x="1553308" y="6118119"/>
+            <a:ext cx="4800600" cy="646331"/>
+          </a:xfrm>
+          <a:prstGeom prst="rect">
+            <a:avLst/>
+          </a:prstGeom>
+          <a:noFill/>
+        </p:spPr>
+        <p:txBody>
+          <a:bodyPr wrap="square" rtlCol="0">
+            <a:spAutoFit/>
+          </a:bodyPr>
+          <a:lstStyle/>
           <a:p>
             <a:r>
               <a:rPr lang="en-US" dirty="0" smtClean="0"/>
-              <a:t>Going back to the human group </a:t>
-            </a:r>
-            <a:r>
-              <a:rPr lang="en-US" dirty="0" smtClean="0"/>
-              <a:t>analogy… </a:t>
-            </a:r>
-            <a:r>
-              <a:rPr lang="en-US" dirty="0" smtClean="0"/>
-              <a:t>when working </a:t>
-            </a:r>
-            <a:r>
-              <a:rPr lang="en-US" dirty="0" smtClean="0"/>
-              <a:t>together, </a:t>
-            </a:r>
-            <a:r>
-              <a:rPr lang="en-US" dirty="0" smtClean="0"/>
-              <a:t>each individual in a group has the understanding and skills to achieve their tasks independent of other coworkers.</a:t>
-            </a:r>
-            <a:endParaRPr lang="en-US" dirty="0"/>
+              <a:t>Image source: https</a:t>
+            </a:r>
+            <a:r>
+              <a:rPr lang="en-US" dirty="0"/>
+              <a:t>://en.wikipedia.org/wiki/Data_(Star_Trek)</a:t>
+            </a:r>
           </a:p>
         </p:txBody>
       </p:sp>
@@ -7217,6 +8189,76 @@
                                   </p:childTnLst>
                                 </p:cTn>
                               </p:par>
+                              <p:par>
+                                <p:cTn id="18" presetID="10" presetClass="entr" presetSubtype="0" fill="hold" nodeType="withEffect">
+                                  <p:stCondLst>
+                                    <p:cond delay="0"/>
+                                  </p:stCondLst>
+                                  <p:childTnLst>
+                                    <p:set>
+                                      <p:cBhvr>
+                                        <p:cTn id="19" dur="1" fill="hold">
+                                          <p:stCondLst>
+                                            <p:cond delay="0"/>
+                                          </p:stCondLst>
+                                        </p:cTn>
+                                        <p:tgtEl>
+                                          <p:spTgt spid="1026"/>
+                                        </p:tgtEl>
+                                        <p:attrNameLst>
+                                          <p:attrName>style.visibility</p:attrName>
+                                        </p:attrNameLst>
+                                      </p:cBhvr>
+                                      <p:to>
+                                        <p:strVal val="visible"/>
+                                      </p:to>
+                                    </p:set>
+                                    <p:animEffect transition="in" filter="fade">
+                                      <p:cBhvr>
+                                        <p:cTn id="20" dur="500"/>
+                                        <p:tgtEl>
+                                          <p:spTgt spid="1026"/>
+                                        </p:tgtEl>
+                                      </p:cBhvr>
+                                    </p:animEffect>
+                                  </p:childTnLst>
+                                </p:cTn>
+                              </p:par>
+                              <p:par>
+                                <p:cTn id="21" presetID="10" presetClass="entr" presetSubtype="0" fill="hold" grpId="0" nodeType="withEffect">
+                                  <p:stCondLst>
+                                    <p:cond delay="0"/>
+                                  </p:stCondLst>
+                                  <p:childTnLst>
+                                    <p:set>
+                                      <p:cBhvr>
+                                        <p:cTn id="22" dur="1" fill="hold">
+                                          <p:stCondLst>
+                                            <p:cond delay="0"/>
+                                          </p:stCondLst>
+                                        </p:cTn>
+                                        <p:tgtEl>
+                                          <p:spTgt spid="4"/>
+                                        </p:tgtEl>
+                                        <p:attrNameLst>
+                                          <p:attrName>style.visibility</p:attrName>
+                                        </p:attrNameLst>
+                                      </p:cBhvr>
+                                      <p:to>
+                                        <p:strVal val="visible"/>
+                                      </p:to>
+                                    </p:set>
+                                    <p:animEffect transition="in" filter="fade">
+                                      <p:cBhvr>
+                                        <p:cTn id="23" dur="500"/>
+                                        <p:tgtEl>
+                                          <p:spTgt spid="4"/>
+                                        </p:tgtEl>
+                                      </p:cBhvr>
+                                    </p:animEffect>
+                                  </p:childTnLst>
+                                </p:cTn>
+                              </p:par>
                             </p:childTnLst>
                           </p:cTn>
                         </p:par>
@@ -7246,7 +8288,8 @@
     </p:tnLst>
     <p:bldLst>
       <p:bldP spid="2" grpId="0"/>
-      <p:bldP spid="3" grpId="0" build="p"/>
+      <p:bldP spid="3" grpId="0" uiExpand="1" build="p"/>
+      <p:bldP spid="4" grpId="0"/>
     </p:bldLst>
   </p:timing>
 </p:sld>
@@ -7924,11 +8967,7 @@
             </a:pPr>
             <a:r>
               <a:rPr lang="en-US" dirty="0" smtClean="0"/>
-              <a:t>then why do we design software that way</a:t>
-            </a:r>
-            <a:r>
-              <a:rPr lang="en-US" dirty="0" smtClean="0"/>
-              <a:t>?</a:t>
+              <a:t>then why do we design software that way?</a:t>
             </a:r>
           </a:p>
           <a:p>
@@ -8514,15 +9553,7 @@
           <a:p>
             <a:r>
               <a:rPr lang="en-US" sz="3200" dirty="0" smtClean="0"/>
-              <a:t>UML </a:t>
-            </a:r>
-            <a:r>
-              <a:rPr lang="en-US" sz="3200" dirty="0" smtClean="0"/>
-              <a:t>of same program, </a:t>
-            </a:r>
-            <a:r>
-              <a:rPr lang="en-US" sz="3200" dirty="0" smtClean="0"/>
-              <a:t>AOP design</a:t>
+              <a:t>UML of same program, AOP design</a:t>
             </a:r>
             <a:endParaRPr lang="en-US" sz="3200" dirty="0"/>
           </a:p>
@@ -8771,10 +9802,15 @@
             <p:ph idx="1"/>
           </p:nvPr>
         </p:nvSpPr>
-        <p:spPr/>
+        <p:spPr>
+          <a:xfrm>
+            <a:off x="152400" y="1600200"/>
+            <a:ext cx="8839200" cy="5105400"/>
+          </a:xfrm>
+        </p:spPr>
         <p:txBody>
           <a:bodyPr>
-            <a:normAutofit fontScale="92500" lnSpcReduction="20000"/>
+            <a:normAutofit fontScale="47500" lnSpcReduction="20000"/>
           </a:bodyPr>
           <a:lstStyle/>
           <a:p>
@@ -8782,7 +9818,7 @@
               <a:buNone/>
             </a:pPr>
             <a:r>
-              <a:rPr lang="en-US" dirty="0" smtClean="0"/>
+              <a:rPr lang="en-US" sz="4200" dirty="0" smtClean="0"/>
               <a:t>Can a human mind be considered encapsulated?</a:t>
             </a:r>
           </a:p>
@@ -8792,7 +9828,7 @@
               <a:buChar char="-"/>
             </a:pPr>
             <a:r>
-              <a:rPr lang="en-US" dirty="0" smtClean="0"/>
+              <a:rPr lang="en-US" sz="4200" dirty="0" smtClean="0"/>
               <a:t>You can ask people to perform tasks without knowing how they do it.</a:t>
             </a:r>
           </a:p>
@@ -8802,53 +9838,81 @@
               <a:buChar char="-"/>
             </a:pPr>
             <a:r>
-              <a:rPr lang="en-US" dirty="0" smtClean="0"/>
-              <a:t>We can’t forcefully change the information contained within someone’s mind. (ex. their name or birthday)</a:t>
-            </a:r>
+              <a:rPr lang="en-US" sz="4200" dirty="0" smtClean="0"/>
+              <a:t>We can’t forcefully change the information contained within someone’s mind. (ex. their name or birthday</a:t>
+            </a:r>
+            <a:r>
+              <a:rPr lang="en-US" sz="4200" dirty="0" smtClean="0"/>
+              <a:t>) but we can learn useful info from them.</a:t>
+            </a:r>
+            <a:endParaRPr lang="en-US" sz="4200" dirty="0" smtClean="0"/>
           </a:p>
           <a:p>
             <a:pPr marL="0" indent="0">
               <a:buNone/>
             </a:pPr>
-            <a:endParaRPr lang="en-US" dirty="0" smtClean="0"/>
+            <a:endParaRPr lang="en-US" sz="4200" dirty="0" smtClean="0"/>
           </a:p>
           <a:p>
             <a:pPr marL="0" indent="0">
               <a:buNone/>
             </a:pPr>
             <a:r>
-              <a:rPr lang="en-US" dirty="0" smtClean="0"/>
-              <a:t>Agents are designed to interact after this concept.</a:t>
+              <a:rPr lang="en-US" sz="4200" dirty="0" smtClean="0"/>
+              <a:t>Agents are designed to interact after this concept</a:t>
+            </a:r>
+            <a:r>
+              <a:rPr lang="en-US" sz="4200" dirty="0" smtClean="0"/>
+              <a:t>.</a:t>
             </a:r>
           </a:p>
           <a:p>
             <a:pPr marL="0" indent="0">
               <a:buNone/>
             </a:pPr>
-            <a:endParaRPr lang="en-US" dirty="0" smtClean="0"/>
+            <a:endParaRPr lang="en-US" sz="4200" dirty="0" smtClean="0"/>
           </a:p>
           <a:p>
             <a:pPr marL="0" indent="0">
               <a:buNone/>
             </a:pPr>
             <a:r>
-              <a:rPr lang="en-US" dirty="0" smtClean="0"/>
+              <a:rPr lang="en-US" sz="4200" dirty="0" smtClean="0"/>
+              <a:t>Instead of using “getters” and “setters” like in OOP, agents simply “ask” other agents for any needed information. </a:t>
+            </a:r>
+            <a:r>
+              <a:rPr lang="en-US" sz="4200" dirty="0" smtClean="0"/>
+              <a:t>The data is then copied over into the agent’s “mind”. Now two agents contain two distinct variables which can be freely altered without breaking code. </a:t>
+            </a:r>
+          </a:p>
+          <a:p>
+            <a:pPr marL="0" indent="0">
+              <a:buNone/>
+            </a:pPr>
+            <a:endParaRPr lang="en-US" sz="4200" dirty="0" smtClean="0"/>
+          </a:p>
+          <a:p>
+            <a:pPr marL="0" indent="0">
+              <a:buNone/>
+            </a:pPr>
+            <a:r>
+              <a:rPr lang="en-US" sz="4200" dirty="0" smtClean="0"/>
               <a:t>This model develops </a:t>
             </a:r>
             <a:r>
-              <a:rPr lang="en-US" dirty="0"/>
+              <a:rPr lang="en-US" sz="4200" dirty="0"/>
               <a:t>data integrity by preventing agents changing the </a:t>
             </a:r>
             <a:r>
-              <a:rPr lang="en-US" dirty="0" smtClean="0"/>
+              <a:rPr lang="en-US" sz="4200" dirty="0" smtClean="0"/>
               <a:t>variables </a:t>
             </a:r>
             <a:r>
-              <a:rPr lang="en-US" dirty="0"/>
+              <a:rPr lang="en-US" sz="4200" dirty="0"/>
               <a:t>of one another unless they specifically ask for such information</a:t>
             </a:r>
             <a:r>
-              <a:rPr lang="en-US" dirty="0" smtClean="0"/>
+              <a:rPr lang="en-US" sz="4200" dirty="0" smtClean="0"/>
               <a:t>. </a:t>
             </a:r>
           </a:p>
@@ -9229,6 +10293,67 @@
                                           <p:spTgt spid="3">
                                             <p:txEl>
                                               <p:pRg st="6" end="6"/>
+                                            </p:txEl>
+                                          </p:spTgt>
+                                        </p:tgtEl>
+                                      </p:cBhvr>
+                                    </p:animEffect>
+                                  </p:childTnLst>
+                                </p:cTn>
+                              </p:par>
+                            </p:childTnLst>
+                          </p:cTn>
+                        </p:par>
+                      </p:childTnLst>
+                    </p:cTn>
+                  </p:par>
+                  <p:par>
+                    <p:cTn id="33" fill="hold">
+                      <p:stCondLst>
+                        <p:cond delay="indefinite"/>
+                      </p:stCondLst>
+                      <p:childTnLst>
+                        <p:par>
+                          <p:cTn id="34" fill="hold">
+                            <p:stCondLst>
+                              <p:cond delay="0"/>
+                            </p:stCondLst>
+                            <p:childTnLst>
+                              <p:par>
+                                <p:cTn id="35" presetID="10" presetClass="entr" presetSubtype="0" fill="hold" grpId="0" nodeType="clickEffect">
+                                  <p:stCondLst>
+                                    <p:cond delay="0"/>
+                                  </p:stCondLst>
+                                  <p:childTnLst>
+                                    <p:set>
+                                      <p:cBhvr>
+                                        <p:cTn id="36" dur="1" fill="hold">
+                                          <p:stCondLst>
+                                            <p:cond delay="0"/>
+                                          </p:stCondLst>
+                                        </p:cTn>
+                                        <p:tgtEl>
+                                          <p:spTgt spid="3">
+                                            <p:txEl>
+                                              <p:pRg st="8" end="8"/>
+                                            </p:txEl>
+                                          </p:spTgt>
+                                        </p:tgtEl>
+                                        <p:attrNameLst>
+                                          <p:attrName>style.visibility</p:attrName>
+                                        </p:attrNameLst>
+                                      </p:cBhvr>
+                                      <p:to>
+                                        <p:strVal val="visible"/>
+                                      </p:to>
+                                    </p:set>
+                                    <p:animEffect transition="in" filter="fade">
+                                      <p:cBhvr>
+                                        <p:cTn id="37" dur="500"/>
+                                        <p:tgtEl>
+                                          <p:spTgt spid="3">
+                                            <p:txEl>
+                                              <p:pRg st="8" end="8"/>
                                             </p:txEl>
                                           </p:spTgt>
                                         </p:tgtEl>

</xml_diff>